<commit_message>
lagt till groovy i os-seminarie
</commit_message>
<xml_diff>
--- a/groovyseminarie/dokument/open_source.pptx
+++ b/groovyseminarie/dokument/open_source.pptx
@@ -5,24 +5,58 @@
     <p:sldMasterId id="2147483683" r:id="rId1"/>
   </p:sldMasterIdLst>
   <p:notesMasterIdLst>
-    <p:notesMasterId r:id="rId14"/>
+    <p:notesMasterId r:id="rId48"/>
   </p:notesMasterIdLst>
   <p:handoutMasterIdLst>
-    <p:handoutMasterId r:id="rId15"/>
+    <p:handoutMasterId r:id="rId49"/>
   </p:handoutMasterIdLst>
   <p:sldIdLst>
     <p:sldId id="271" r:id="rId2"/>
-    <p:sldId id="278" r:id="rId3"/>
-    <p:sldId id="280" r:id="rId4"/>
-    <p:sldId id="279" r:id="rId5"/>
-    <p:sldId id="272" r:id="rId6"/>
-    <p:sldId id="281" r:id="rId7"/>
-    <p:sldId id="276" r:id="rId8"/>
-    <p:sldId id="286" r:id="rId9"/>
-    <p:sldId id="282" r:id="rId10"/>
-    <p:sldId id="283" r:id="rId11"/>
-    <p:sldId id="284" r:id="rId12"/>
-    <p:sldId id="285" r:id="rId13"/>
+    <p:sldId id="287" r:id="rId3"/>
+    <p:sldId id="278" r:id="rId4"/>
+    <p:sldId id="288" r:id="rId5"/>
+    <p:sldId id="289" r:id="rId6"/>
+    <p:sldId id="290" r:id="rId7"/>
+    <p:sldId id="291" r:id="rId8"/>
+    <p:sldId id="325" r:id="rId9"/>
+    <p:sldId id="280" r:id="rId10"/>
+    <p:sldId id="292" r:id="rId11"/>
+    <p:sldId id="293" r:id="rId12"/>
+    <p:sldId id="294" r:id="rId13"/>
+    <p:sldId id="295" r:id="rId14"/>
+    <p:sldId id="279" r:id="rId15"/>
+    <p:sldId id="296" r:id="rId16"/>
+    <p:sldId id="297" r:id="rId17"/>
+    <p:sldId id="298" r:id="rId18"/>
+    <p:sldId id="272" r:id="rId19"/>
+    <p:sldId id="299" r:id="rId20"/>
+    <p:sldId id="300" r:id="rId21"/>
+    <p:sldId id="301" r:id="rId22"/>
+    <p:sldId id="302" r:id="rId23"/>
+    <p:sldId id="304" r:id="rId24"/>
+    <p:sldId id="305" r:id="rId25"/>
+    <p:sldId id="306" r:id="rId26"/>
+    <p:sldId id="307" r:id="rId27"/>
+    <p:sldId id="276" r:id="rId28"/>
+    <p:sldId id="308" r:id="rId29"/>
+    <p:sldId id="309" r:id="rId30"/>
+    <p:sldId id="310" r:id="rId31"/>
+    <p:sldId id="311" r:id="rId32"/>
+    <p:sldId id="312" r:id="rId33"/>
+    <p:sldId id="313" r:id="rId34"/>
+    <p:sldId id="286" r:id="rId35"/>
+    <p:sldId id="314" r:id="rId36"/>
+    <p:sldId id="315" r:id="rId37"/>
+    <p:sldId id="282" r:id="rId38"/>
+    <p:sldId id="316" r:id="rId39"/>
+    <p:sldId id="317" r:id="rId40"/>
+    <p:sldId id="319" r:id="rId41"/>
+    <p:sldId id="320" r:id="rId42"/>
+    <p:sldId id="321" r:id="rId43"/>
+    <p:sldId id="322" r:id="rId44"/>
+    <p:sldId id="285" r:id="rId45"/>
+    <p:sldId id="323" r:id="rId46"/>
+    <p:sldId id="324" r:id="rId47"/>
   </p:sldIdLst>
   <p:sldSz cx="9144000" cy="6858000" type="screen4x3"/>
   <p:notesSz cx="6711950" cy="9844088"/>
@@ -4275,28 +4309,6 @@
           <a:bodyPr/>
           <a:lstStyle/>
           <a:p>
-            <a:r>
-              <a:rPr lang="sv-SE" b="1" dirty="0" smtClean="0"/>
-              <a:t>Öppen källkod</a:t>
-            </a:r>
-            <a:r>
-              <a:rPr lang="sv-SE" dirty="0" smtClean="0"/>
-              <a:t>, engelska </a:t>
-            </a:r>
-            <a:r>
-              <a:rPr lang="sv-SE" i="1" dirty="0" smtClean="0"/>
-              <a:t>Open </a:t>
-            </a:r>
-            <a:r>
-              <a:rPr lang="sv-SE" i="1" dirty="0" err="1" smtClean="0"/>
-              <a:t>Source</a:t>
-            </a:r>
-            <a:r>
-              <a:rPr lang="sv-SE" dirty="0" smtClean="0"/>
-              <a:t>, är datorprogram där källkoden är tillgänglig att använda, läsa, modifiera och vidaredistribuera för den som vill</a:t>
-            </a:r>
-          </a:p>
-          <a:p>
             <a:endParaRPr lang="sv-SE" dirty="0"/>
           </a:p>
         </p:txBody>
@@ -4306,6 +4318,13 @@
   <p:clrMapOvr>
     <a:masterClrMapping/>
   </p:clrMapOvr>
+  <p:timing>
+    <p:tnLst>
+      <p:par>
+        <p:cTn id="1" dur="indefinite" restart="never" nodeType="tmRoot"/>
+      </p:par>
+    </p:tnLst>
+  </p:timing>
 </p:sld>
 </file>
 
@@ -4343,7 +4362,11 @@
           <a:p>
             <a:r>
               <a:rPr lang="sv-SE" dirty="0" smtClean="0"/>
-              <a:t>Det finns ju ingen ansvarig?</a:t>
+              <a:t>Företag inom Open </a:t>
+            </a:r>
+            <a:r>
+              <a:rPr lang="sv-SE" dirty="0" err="1" smtClean="0"/>
+              <a:t>Source</a:t>
             </a:r>
             <a:endParaRPr lang="sv-SE" dirty="0"/>
           </a:p>
@@ -4366,23 +4389,8 @@
           <a:p>
             <a:r>
               <a:rPr lang="sv-SE" dirty="0" smtClean="0"/>
-              <a:t>Vem ska jag stämma?</a:t>
-            </a:r>
-          </a:p>
-          <a:p>
-            <a:r>
-              <a:rPr lang="sv-SE" dirty="0" smtClean="0"/>
-              <a:t>De flesta kommersiella produkter kräver godkännande av en ”Legal </a:t>
-            </a:r>
-            <a:r>
-              <a:rPr lang="sv-SE" dirty="0" err="1" smtClean="0"/>
-              <a:t>disclaimer</a:t>
-            </a:r>
-            <a:r>
-              <a:rPr lang="sv-SE" dirty="0" smtClean="0"/>
-              <a:t>”</a:t>
-            </a:r>
-            <a:endParaRPr lang="sv-SE" dirty="0"/>
+              <a:t>Apache Software Foundation</a:t>
+            </a:r>
           </a:p>
         </p:txBody>
       </p:sp>
@@ -4391,6 +4399,13 @@
   <p:clrMapOvr>
     <a:masterClrMapping/>
   </p:clrMapOvr>
+  <p:timing>
+    <p:tnLst>
+      <p:par>
+        <p:cTn id="1" dur="indefinite" restart="never" nodeType="tmRoot"/>
+      </p:par>
+    </p:tnLst>
+  </p:timing>
 </p:sld>
 </file>
 
@@ -4428,15 +4443,11 @@
           <a:p>
             <a:r>
               <a:rPr lang="sv-SE" dirty="0" smtClean="0"/>
-              <a:t>Legal </a:t>
+              <a:t>Företag inom Open </a:t>
             </a:r>
             <a:r>
               <a:rPr lang="sv-SE" dirty="0" err="1" smtClean="0"/>
-              <a:t>Disclaimer</a:t>
-            </a:r>
-            <a:r>
-              <a:rPr lang="sv-SE" dirty="0" smtClean="0"/>
-              <a:t> exempel</a:t>
+              <a:t>Source</a:t>
             </a:r>
             <a:endParaRPr lang="sv-SE" dirty="0"/>
           </a:p>
@@ -4458,34 +4469,16 @@
           <a:lstStyle/>
           <a:p>
             <a:r>
-              <a:rPr lang="sv-SE" dirty="0" smtClean="0">
-                <a:hlinkClick r:id="rId2"/>
-              </a:rPr>
-              <a:t>http://</a:t>
-            </a:r>
-            <a:r>
-              <a:rPr lang="sv-SE" dirty="0" smtClean="0">
-                <a:hlinkClick r:id="rId2"/>
-              </a:rPr>
-              <a:t>www.adobe.com/misc/copyright.html</a:t>
-            </a:r>
-            <a:r>
-              <a:rPr lang="sv-SE" dirty="0" smtClean="0"/>
-              <a:t>: ”</a:t>
-            </a:r>
-            <a:r>
-              <a:rPr lang="en-US" dirty="0" smtClean="0"/>
-              <a:t>… USE OF ANY MATERIALS IS DONE AT YOUR OWN DISCRETION AND RISK AND WITH YOUR AGREEMENT THAT YOU WILL BE SOLELY RESPONSIBLE FOR ANY DAMAGE TO YOUR COMPUTER </a:t>
-            </a:r>
-            <a:r>
-              <a:rPr lang="en-US" dirty="0" smtClean="0"/>
-              <a:t>SYSTEM…</a:t>
-            </a:r>
-            <a:r>
-              <a:rPr lang="sv-SE" dirty="0" smtClean="0"/>
-              <a:t>”</a:t>
-            </a:r>
-            <a:endParaRPr lang="sv-SE" dirty="0"/>
+              <a:rPr lang="sv-SE" dirty="0" smtClean="0"/>
+              <a:t>Apache Software Foundation</a:t>
+            </a:r>
+          </a:p>
+          <a:p>
+            <a:r>
+              <a:rPr lang="sv-SE" dirty="0" err="1" smtClean="0"/>
+              <a:t>JBoss</a:t>
+            </a:r>
+            <a:endParaRPr lang="sv-SE" dirty="0" smtClean="0"/>
           </a:p>
         </p:txBody>
       </p:sp>
@@ -4530,8 +4523,12 @@
           <a:lstStyle/>
           <a:p>
             <a:r>
+              <a:rPr lang="sv-SE" dirty="0" smtClean="0"/>
+              <a:t>Företag inom Open </a:t>
+            </a:r>
+            <a:r>
               <a:rPr lang="sv-SE" dirty="0" err="1" smtClean="0"/>
-              <a:t>Sammafattning</a:t>
+              <a:t>Source</a:t>
             </a:r>
             <a:endParaRPr lang="sv-SE" dirty="0"/>
           </a:p>
@@ -4554,47 +4551,610 @@
           <a:p>
             <a:r>
               <a:rPr lang="sv-SE" dirty="0" smtClean="0"/>
-              <a:t>Det är svårt att säga att Open </a:t>
-            </a:r>
+              <a:t>Apache Software Foundation</a:t>
+            </a:r>
+          </a:p>
+          <a:p>
             <a:r>
               <a:rPr lang="sv-SE" dirty="0" err="1" smtClean="0"/>
-              <a:t>source</a:t>
-            </a:r>
-            <a:r>
-              <a:rPr lang="sv-SE" dirty="0" smtClean="0"/>
-              <a:t> är </a:t>
-            </a:r>
-            <a:r>
-              <a:rPr lang="sv-SE" i="1" dirty="0" smtClean="0"/>
-              <a:t>bättre </a:t>
-            </a:r>
-            <a:r>
-              <a:rPr lang="sv-SE" dirty="0" smtClean="0"/>
-              <a:t>än kommersiella programvaror</a:t>
-            </a:r>
-          </a:p>
-          <a:p>
-            <a:r>
-              <a:rPr lang="sv-SE" dirty="0" smtClean="0"/>
-              <a:t>Bäst är att utvärdera från fall till fall (Fast jag kommer nog oftast välja </a:t>
-            </a:r>
+              <a:t>JBoss</a:t>
+            </a:r>
+            <a:endParaRPr lang="sv-SE" dirty="0" smtClean="0"/>
+          </a:p>
+          <a:p>
             <a:r>
               <a:rPr lang="sv-SE" dirty="0" err="1" smtClean="0"/>
-              <a:t>open</a:t>
-            </a:r>
-            <a:r>
-              <a:rPr lang="sv-SE" dirty="0" smtClean="0"/>
-              <a:t> </a:t>
+              <a:t>MySQL</a:t>
+            </a:r>
+            <a:endParaRPr lang="sv-SE" dirty="0" smtClean="0"/>
+          </a:p>
+        </p:txBody>
+      </p:sp>
+    </p:spTree>
+  </p:cSld>
+  <p:clrMapOvr>
+    <a:masterClrMapping/>
+  </p:clrMapOvr>
+</p:sld>
+</file>
+
+<file path=ppt/slides/slide13.xml><?xml version="1.0" encoding="utf-8"?>
+<p:sld xmlns:a="http://schemas.openxmlformats.org/drawingml/2006/main" xmlns:r="http://schemas.openxmlformats.org/officeDocument/2006/relationships" xmlns:p="http://schemas.openxmlformats.org/presentationml/2006/main">
+  <p:cSld>
+    <p:spTree>
+      <p:nvGrpSpPr>
+        <p:cNvPr id="1" name=""/>
+        <p:cNvGrpSpPr/>
+        <p:nvPr/>
+      </p:nvGrpSpPr>
+      <p:grpSpPr>
+        <a:xfrm>
+          <a:off x="0" y="0"/>
+          <a:ext cx="0" cy="0"/>
+          <a:chOff x="0" y="0"/>
+          <a:chExt cx="0" cy="0"/>
+        </a:xfrm>
+      </p:grpSpPr>
+      <p:sp>
+        <p:nvSpPr>
+          <p:cNvPr id="2" name="Rubrik 1"/>
+          <p:cNvSpPr>
+            <a:spLocks noGrp="1"/>
+          </p:cNvSpPr>
+          <p:nvPr>
+            <p:ph type="title"/>
+          </p:nvPr>
+        </p:nvSpPr>
+        <p:spPr/>
+        <p:txBody>
+          <a:bodyPr/>
+          <a:lstStyle/>
+          <a:p>
+            <a:r>
+              <a:rPr lang="sv-SE" dirty="0" smtClean="0"/>
+              <a:t>Företag inom Open </a:t>
             </a:r>
             <a:r>
               <a:rPr lang="sv-SE" dirty="0" err="1" smtClean="0"/>
-              <a:t>sourcelösningar</a:t>
-            </a:r>
-            <a:r>
-              <a:rPr lang="sv-SE" dirty="0" smtClean="0"/>
-              <a:t>)</a:t>
+              <a:t>Source</a:t>
             </a:r>
             <a:endParaRPr lang="sv-SE" dirty="0"/>
+          </a:p>
+        </p:txBody>
+      </p:sp>
+      <p:sp>
+        <p:nvSpPr>
+          <p:cNvPr id="3" name="Platshållare för innehåll 2"/>
+          <p:cNvSpPr>
+            <a:spLocks noGrp="1"/>
+          </p:cNvSpPr>
+          <p:nvPr>
+            <p:ph idx="1"/>
+          </p:nvPr>
+        </p:nvSpPr>
+        <p:spPr/>
+        <p:txBody>
+          <a:bodyPr/>
+          <a:lstStyle/>
+          <a:p>
+            <a:r>
+              <a:rPr lang="sv-SE" dirty="0" smtClean="0"/>
+              <a:t>Apache Software Foundation</a:t>
+            </a:r>
+          </a:p>
+          <a:p>
+            <a:r>
+              <a:rPr lang="sv-SE" dirty="0" err="1" smtClean="0"/>
+              <a:t>JBoss</a:t>
+            </a:r>
+            <a:endParaRPr lang="sv-SE" dirty="0" smtClean="0"/>
+          </a:p>
+          <a:p>
+            <a:r>
+              <a:rPr lang="sv-SE" dirty="0" err="1" smtClean="0"/>
+              <a:t>MySQL</a:t>
+            </a:r>
+            <a:endParaRPr lang="sv-SE" dirty="0" smtClean="0"/>
+          </a:p>
+          <a:p>
+            <a:r>
+              <a:rPr lang="sv-SE" dirty="0" err="1" smtClean="0"/>
+              <a:t>SugarCRM</a:t>
+            </a:r>
+            <a:endParaRPr lang="sv-SE" dirty="0"/>
+          </a:p>
+        </p:txBody>
+      </p:sp>
+    </p:spTree>
+  </p:cSld>
+  <p:clrMapOvr>
+    <a:masterClrMapping/>
+  </p:clrMapOvr>
+</p:sld>
+</file>
+
+<file path=ppt/slides/slide14.xml><?xml version="1.0" encoding="utf-8"?>
+<p:sld xmlns:a="http://schemas.openxmlformats.org/drawingml/2006/main" xmlns:r="http://schemas.openxmlformats.org/officeDocument/2006/relationships" xmlns:p="http://schemas.openxmlformats.org/presentationml/2006/main">
+  <p:cSld>
+    <p:spTree>
+      <p:nvGrpSpPr>
+        <p:cNvPr id="1" name=""/>
+        <p:cNvGrpSpPr/>
+        <p:nvPr/>
+      </p:nvGrpSpPr>
+      <p:grpSpPr>
+        <a:xfrm>
+          <a:off x="0" y="0"/>
+          <a:ext cx="0" cy="0"/>
+          <a:chOff x="0" y="0"/>
+          <a:chExt cx="0" cy="0"/>
+        </a:xfrm>
+      </p:grpSpPr>
+      <p:sp>
+        <p:nvSpPr>
+          <p:cNvPr id="2" name="Rubrik 1"/>
+          <p:cNvSpPr>
+            <a:spLocks noGrp="1"/>
+          </p:cNvSpPr>
+          <p:nvPr>
+            <p:ph type="title"/>
+          </p:nvPr>
+        </p:nvSpPr>
+        <p:spPr>
+          <a:xfrm>
+            <a:off x="481013" y="349250"/>
+            <a:ext cx="7543800" cy="1518739"/>
+          </a:xfrm>
+        </p:spPr>
+        <p:txBody>
+          <a:bodyPr/>
+          <a:lstStyle/>
+          <a:p>
+            <a:r>
+              <a:rPr lang="sv-SE" dirty="0" smtClean="0"/>
+              <a:t>Vanliga prioriteringar inom kommersiella programvaror</a:t>
+            </a:r>
+            <a:endParaRPr lang="sv-SE" dirty="0"/>
+          </a:p>
+        </p:txBody>
+      </p:sp>
+      <p:sp>
+        <p:nvSpPr>
+          <p:cNvPr id="3" name="Platshållare för innehåll 2"/>
+          <p:cNvSpPr>
+            <a:spLocks noGrp="1"/>
+          </p:cNvSpPr>
+          <p:nvPr>
+            <p:ph idx="1"/>
+          </p:nvPr>
+        </p:nvSpPr>
+        <p:spPr>
+          <a:xfrm>
+            <a:off x="469900" y="1841862"/>
+            <a:ext cx="8229600" cy="4177937"/>
+          </a:xfrm>
+        </p:spPr>
+        <p:txBody>
+          <a:bodyPr/>
+          <a:lstStyle/>
+          <a:p>
+            <a:endParaRPr lang="sv-SE" dirty="0"/>
+          </a:p>
+        </p:txBody>
+      </p:sp>
+    </p:spTree>
+  </p:cSld>
+  <p:clrMapOvr>
+    <a:masterClrMapping/>
+  </p:clrMapOvr>
+</p:sld>
+</file>
+
+<file path=ppt/slides/slide15.xml><?xml version="1.0" encoding="utf-8"?>
+<p:sld xmlns:a="http://schemas.openxmlformats.org/drawingml/2006/main" xmlns:r="http://schemas.openxmlformats.org/officeDocument/2006/relationships" xmlns:p="http://schemas.openxmlformats.org/presentationml/2006/main">
+  <p:cSld>
+    <p:spTree>
+      <p:nvGrpSpPr>
+        <p:cNvPr id="1" name=""/>
+        <p:cNvGrpSpPr/>
+        <p:nvPr/>
+      </p:nvGrpSpPr>
+      <p:grpSpPr>
+        <a:xfrm>
+          <a:off x="0" y="0"/>
+          <a:ext cx="0" cy="0"/>
+          <a:chOff x="0" y="0"/>
+          <a:chExt cx="0" cy="0"/>
+        </a:xfrm>
+      </p:grpSpPr>
+      <p:sp>
+        <p:nvSpPr>
+          <p:cNvPr id="2" name="Rubrik 1"/>
+          <p:cNvSpPr>
+            <a:spLocks noGrp="1"/>
+          </p:cNvSpPr>
+          <p:nvPr>
+            <p:ph type="title"/>
+          </p:nvPr>
+        </p:nvSpPr>
+        <p:spPr>
+          <a:xfrm>
+            <a:off x="481013" y="349250"/>
+            <a:ext cx="7543800" cy="1518739"/>
+          </a:xfrm>
+        </p:spPr>
+        <p:txBody>
+          <a:bodyPr/>
+          <a:lstStyle/>
+          <a:p>
+            <a:r>
+              <a:rPr lang="sv-SE" dirty="0" smtClean="0"/>
+              <a:t>Vanliga prioriteringar inom kommersiella programvaror</a:t>
+            </a:r>
+            <a:endParaRPr lang="sv-SE" dirty="0"/>
+          </a:p>
+        </p:txBody>
+      </p:sp>
+      <p:sp>
+        <p:nvSpPr>
+          <p:cNvPr id="3" name="Platshållare för innehåll 2"/>
+          <p:cNvSpPr>
+            <a:spLocks noGrp="1"/>
+          </p:cNvSpPr>
+          <p:nvPr>
+            <p:ph idx="1"/>
+          </p:nvPr>
+        </p:nvSpPr>
+        <p:spPr>
+          <a:xfrm>
+            <a:off x="469900" y="1841862"/>
+            <a:ext cx="8229600" cy="4177937"/>
+          </a:xfrm>
+        </p:spPr>
+        <p:txBody>
+          <a:bodyPr/>
+          <a:lstStyle/>
+          <a:p>
+            <a:r>
+              <a:rPr lang="sv-SE" dirty="0" smtClean="0"/>
+              <a:t>Tjäna pengar på produkten (såklart)</a:t>
+            </a:r>
+          </a:p>
+        </p:txBody>
+      </p:sp>
+    </p:spTree>
+  </p:cSld>
+  <p:clrMapOvr>
+    <a:masterClrMapping/>
+  </p:clrMapOvr>
+</p:sld>
+</file>
+
+<file path=ppt/slides/slide16.xml><?xml version="1.0" encoding="utf-8"?>
+<p:sld xmlns:a="http://schemas.openxmlformats.org/drawingml/2006/main" xmlns:r="http://schemas.openxmlformats.org/officeDocument/2006/relationships" xmlns:p="http://schemas.openxmlformats.org/presentationml/2006/main">
+  <p:cSld>
+    <p:spTree>
+      <p:nvGrpSpPr>
+        <p:cNvPr id="1" name=""/>
+        <p:cNvGrpSpPr/>
+        <p:nvPr/>
+      </p:nvGrpSpPr>
+      <p:grpSpPr>
+        <a:xfrm>
+          <a:off x="0" y="0"/>
+          <a:ext cx="0" cy="0"/>
+          <a:chOff x="0" y="0"/>
+          <a:chExt cx="0" cy="0"/>
+        </a:xfrm>
+      </p:grpSpPr>
+      <p:sp>
+        <p:nvSpPr>
+          <p:cNvPr id="2" name="Rubrik 1"/>
+          <p:cNvSpPr>
+            <a:spLocks noGrp="1"/>
+          </p:cNvSpPr>
+          <p:nvPr>
+            <p:ph type="title"/>
+          </p:nvPr>
+        </p:nvSpPr>
+        <p:spPr>
+          <a:xfrm>
+            <a:off x="481013" y="349250"/>
+            <a:ext cx="7543800" cy="1518739"/>
+          </a:xfrm>
+        </p:spPr>
+        <p:txBody>
+          <a:bodyPr/>
+          <a:lstStyle/>
+          <a:p>
+            <a:r>
+              <a:rPr lang="sv-SE" dirty="0" smtClean="0"/>
+              <a:t>Vanliga prioriteringar inom kommersiella programvaror</a:t>
+            </a:r>
+            <a:endParaRPr lang="sv-SE" dirty="0"/>
+          </a:p>
+        </p:txBody>
+      </p:sp>
+      <p:sp>
+        <p:nvSpPr>
+          <p:cNvPr id="3" name="Platshållare för innehåll 2"/>
+          <p:cNvSpPr>
+            <a:spLocks noGrp="1"/>
+          </p:cNvSpPr>
+          <p:nvPr>
+            <p:ph idx="1"/>
+          </p:nvPr>
+        </p:nvSpPr>
+        <p:spPr>
+          <a:xfrm>
+            <a:off x="469900" y="1841862"/>
+            <a:ext cx="8229600" cy="4177937"/>
+          </a:xfrm>
+        </p:spPr>
+        <p:txBody>
+          <a:bodyPr/>
+          <a:lstStyle/>
+          <a:p>
+            <a:r>
+              <a:rPr lang="sv-SE" dirty="0" smtClean="0"/>
+              <a:t>Tjäna pengar på produkten (såklart)</a:t>
+            </a:r>
+          </a:p>
+          <a:p>
+            <a:r>
+              <a:rPr lang="sv-SE" dirty="0" smtClean="0"/>
+              <a:t>Time to market</a:t>
+            </a:r>
+          </a:p>
+        </p:txBody>
+      </p:sp>
+    </p:spTree>
+  </p:cSld>
+  <p:clrMapOvr>
+    <a:masterClrMapping/>
+  </p:clrMapOvr>
+</p:sld>
+</file>
+
+<file path=ppt/slides/slide17.xml><?xml version="1.0" encoding="utf-8"?>
+<p:sld xmlns:a="http://schemas.openxmlformats.org/drawingml/2006/main" xmlns:r="http://schemas.openxmlformats.org/officeDocument/2006/relationships" xmlns:p="http://schemas.openxmlformats.org/presentationml/2006/main">
+  <p:cSld>
+    <p:spTree>
+      <p:nvGrpSpPr>
+        <p:cNvPr id="1" name=""/>
+        <p:cNvGrpSpPr/>
+        <p:nvPr/>
+      </p:nvGrpSpPr>
+      <p:grpSpPr>
+        <a:xfrm>
+          <a:off x="0" y="0"/>
+          <a:ext cx="0" cy="0"/>
+          <a:chOff x="0" y="0"/>
+          <a:chExt cx="0" cy="0"/>
+        </a:xfrm>
+      </p:grpSpPr>
+      <p:sp>
+        <p:nvSpPr>
+          <p:cNvPr id="2" name="Rubrik 1"/>
+          <p:cNvSpPr>
+            <a:spLocks noGrp="1"/>
+          </p:cNvSpPr>
+          <p:nvPr>
+            <p:ph type="title"/>
+          </p:nvPr>
+        </p:nvSpPr>
+        <p:spPr>
+          <a:xfrm>
+            <a:off x="481013" y="349250"/>
+            <a:ext cx="7543800" cy="1518739"/>
+          </a:xfrm>
+        </p:spPr>
+        <p:txBody>
+          <a:bodyPr/>
+          <a:lstStyle/>
+          <a:p>
+            <a:r>
+              <a:rPr lang="sv-SE" dirty="0" smtClean="0"/>
+              <a:t>Vanliga prioriteringar inom kommersiella programvaror</a:t>
+            </a:r>
+            <a:endParaRPr lang="sv-SE" dirty="0"/>
+          </a:p>
+        </p:txBody>
+      </p:sp>
+      <p:sp>
+        <p:nvSpPr>
+          <p:cNvPr id="3" name="Platshållare för innehåll 2"/>
+          <p:cNvSpPr>
+            <a:spLocks noGrp="1"/>
+          </p:cNvSpPr>
+          <p:nvPr>
+            <p:ph idx="1"/>
+          </p:nvPr>
+        </p:nvSpPr>
+        <p:spPr>
+          <a:xfrm>
+            <a:off x="469900" y="1841862"/>
+            <a:ext cx="8229600" cy="4177937"/>
+          </a:xfrm>
+        </p:spPr>
+        <p:txBody>
+          <a:bodyPr/>
+          <a:lstStyle/>
+          <a:p>
+            <a:r>
+              <a:rPr lang="sv-SE" smtClean="0"/>
+              <a:t>Tjäna pengar på produkten (såklart)</a:t>
+            </a:r>
+          </a:p>
+          <a:p>
+            <a:r>
+              <a:rPr lang="sv-SE" smtClean="0"/>
+              <a:t>Time to market</a:t>
+            </a:r>
+          </a:p>
+          <a:p>
+            <a:r>
+              <a:rPr lang="sv-SE" smtClean="0"/>
+              <a:t>Visuella features</a:t>
+            </a:r>
+            <a:endParaRPr lang="sv-SE" dirty="0"/>
+          </a:p>
+        </p:txBody>
+      </p:sp>
+    </p:spTree>
+  </p:cSld>
+  <p:clrMapOvr>
+    <a:masterClrMapping/>
+  </p:clrMapOvr>
+</p:sld>
+</file>
+
+<file path=ppt/slides/slide18.xml><?xml version="1.0" encoding="utf-8"?>
+<p:sld xmlns:a="http://schemas.openxmlformats.org/drawingml/2006/main" xmlns:r="http://schemas.openxmlformats.org/officeDocument/2006/relationships" xmlns:p="http://schemas.openxmlformats.org/presentationml/2006/main">
+  <p:cSld>
+    <p:spTree>
+      <p:nvGrpSpPr>
+        <p:cNvPr id="1" name=""/>
+        <p:cNvGrpSpPr/>
+        <p:nvPr/>
+      </p:nvGrpSpPr>
+      <p:grpSpPr>
+        <a:xfrm>
+          <a:off x="0" y="0"/>
+          <a:ext cx="0" cy="0"/>
+          <a:chOff x="0" y="0"/>
+          <a:chExt cx="0" cy="0"/>
+        </a:xfrm>
+      </p:grpSpPr>
+      <p:sp>
+        <p:nvSpPr>
+          <p:cNvPr id="2" name="Rubrik 1"/>
+          <p:cNvSpPr>
+            <a:spLocks noGrp="1"/>
+          </p:cNvSpPr>
+          <p:nvPr>
+            <p:ph type="title"/>
+          </p:nvPr>
+        </p:nvSpPr>
+        <p:spPr>
+          <a:xfrm>
+            <a:off x="481013" y="349250"/>
+            <a:ext cx="7543800" cy="1518739"/>
+          </a:xfrm>
+        </p:spPr>
+        <p:txBody>
+          <a:bodyPr/>
+          <a:lstStyle/>
+          <a:p>
+            <a:r>
+              <a:rPr lang="sv-SE" dirty="0" smtClean="0"/>
+              <a:t>Vanliga prioritering inom öppen källkod</a:t>
+            </a:r>
+            <a:endParaRPr lang="sv-SE" dirty="0"/>
+          </a:p>
+        </p:txBody>
+      </p:sp>
+      <p:sp>
+        <p:nvSpPr>
+          <p:cNvPr id="3" name="Platshållare för innehåll 2"/>
+          <p:cNvSpPr>
+            <a:spLocks noGrp="1"/>
+          </p:cNvSpPr>
+          <p:nvPr>
+            <p:ph idx="1"/>
+          </p:nvPr>
+        </p:nvSpPr>
+        <p:spPr>
+          <a:xfrm>
+            <a:off x="469900" y="2377440"/>
+            <a:ext cx="8229600" cy="3642360"/>
+          </a:xfrm>
+        </p:spPr>
+        <p:txBody>
+          <a:bodyPr/>
+          <a:lstStyle/>
+          <a:p>
+            <a:endParaRPr lang="sv-SE" dirty="0"/>
+          </a:p>
+        </p:txBody>
+      </p:sp>
+    </p:spTree>
+  </p:cSld>
+  <p:clrMapOvr>
+    <a:masterClrMapping/>
+  </p:clrMapOvr>
+</p:sld>
+</file>
+
+<file path=ppt/slides/slide19.xml><?xml version="1.0" encoding="utf-8"?>
+<p:sld xmlns:a="http://schemas.openxmlformats.org/drawingml/2006/main" xmlns:r="http://schemas.openxmlformats.org/officeDocument/2006/relationships" xmlns:p="http://schemas.openxmlformats.org/presentationml/2006/main">
+  <p:cSld>
+    <p:spTree>
+      <p:nvGrpSpPr>
+        <p:cNvPr id="1" name=""/>
+        <p:cNvGrpSpPr/>
+        <p:nvPr/>
+      </p:nvGrpSpPr>
+      <p:grpSpPr>
+        <a:xfrm>
+          <a:off x="0" y="0"/>
+          <a:ext cx="0" cy="0"/>
+          <a:chOff x="0" y="0"/>
+          <a:chExt cx="0" cy="0"/>
+        </a:xfrm>
+      </p:grpSpPr>
+      <p:sp>
+        <p:nvSpPr>
+          <p:cNvPr id="2" name="Rubrik 1"/>
+          <p:cNvSpPr>
+            <a:spLocks noGrp="1"/>
+          </p:cNvSpPr>
+          <p:nvPr>
+            <p:ph type="title"/>
+          </p:nvPr>
+        </p:nvSpPr>
+        <p:spPr>
+          <a:xfrm>
+            <a:off x="481013" y="349250"/>
+            <a:ext cx="7543800" cy="1518739"/>
+          </a:xfrm>
+        </p:spPr>
+        <p:txBody>
+          <a:bodyPr/>
+          <a:lstStyle/>
+          <a:p>
+            <a:r>
+              <a:rPr lang="sv-SE" dirty="0" smtClean="0"/>
+              <a:t>Vanliga prioritering inom öppen källkod</a:t>
+            </a:r>
+            <a:endParaRPr lang="sv-SE" dirty="0"/>
+          </a:p>
+        </p:txBody>
+      </p:sp>
+      <p:sp>
+        <p:nvSpPr>
+          <p:cNvPr id="3" name="Platshållare för innehåll 2"/>
+          <p:cNvSpPr>
+            <a:spLocks noGrp="1"/>
+          </p:cNvSpPr>
+          <p:nvPr>
+            <p:ph idx="1"/>
+          </p:nvPr>
+        </p:nvSpPr>
+        <p:spPr>
+          <a:xfrm>
+            <a:off x="469900" y="2377440"/>
+            <a:ext cx="8229600" cy="3642360"/>
+          </a:xfrm>
+        </p:spPr>
+        <p:txBody>
+          <a:bodyPr/>
+          <a:lstStyle/>
+          <a:p>
+            <a:r>
+              <a:rPr lang="sv-SE" dirty="0" smtClean="0"/>
+              <a:t>Kvalitet framför features</a:t>
+            </a:r>
           </a:p>
         </p:txBody>
       </p:sp>
@@ -4640,7 +5200,7 @@
           <a:p>
             <a:r>
               <a:rPr lang="sv-SE" dirty="0" smtClean="0"/>
-              <a:t>Exempel</a:t>
+              <a:t>Öppen källkod</a:t>
             </a:r>
             <a:endParaRPr lang="sv-SE" dirty="0"/>
           </a:p>
@@ -4662,38 +5222,901 @@
           <a:lstStyle/>
           <a:p>
             <a:r>
-              <a:rPr lang="sv-SE" dirty="0" smtClean="0"/>
-              <a:t>Apache (Webbserver)</a:t>
-            </a:r>
-          </a:p>
-          <a:p>
-            <a:r>
-              <a:rPr lang="sv-SE" dirty="0" smtClean="0"/>
-              <a:t>Linux (Operativsystem)</a:t>
-            </a:r>
-          </a:p>
-          <a:p>
+              <a:rPr lang="sv-SE" b="1" dirty="0" smtClean="0"/>
+              <a:t>Öppen källkod</a:t>
+            </a:r>
+            <a:r>
+              <a:rPr lang="sv-SE" dirty="0" smtClean="0"/>
+              <a:t>, engelska </a:t>
+            </a:r>
+            <a:r>
+              <a:rPr lang="sv-SE" i="1" dirty="0" smtClean="0"/>
+              <a:t>Open </a:t>
+            </a:r>
+            <a:r>
+              <a:rPr lang="sv-SE" i="1" dirty="0" err="1" smtClean="0"/>
+              <a:t>Source</a:t>
+            </a:r>
+            <a:r>
+              <a:rPr lang="sv-SE" dirty="0" smtClean="0"/>
+              <a:t>, är datorprogram där källkoden är tillgänglig att använda, läsa, modifiera och vidaredistribuera för den som vill</a:t>
+            </a:r>
+          </a:p>
+          <a:p>
+            <a:endParaRPr lang="sv-SE" dirty="0"/>
+          </a:p>
+        </p:txBody>
+      </p:sp>
+    </p:spTree>
+  </p:cSld>
+  <p:clrMapOvr>
+    <a:masterClrMapping/>
+  </p:clrMapOvr>
+  <p:timing>
+    <p:tnLst>
+      <p:par>
+        <p:cTn id="1" dur="indefinite" restart="never" nodeType="tmRoot"/>
+      </p:par>
+    </p:tnLst>
+  </p:timing>
+</p:sld>
+</file>
+
+<file path=ppt/slides/slide20.xml><?xml version="1.0" encoding="utf-8"?>
+<p:sld xmlns:a="http://schemas.openxmlformats.org/drawingml/2006/main" xmlns:r="http://schemas.openxmlformats.org/officeDocument/2006/relationships" xmlns:p="http://schemas.openxmlformats.org/presentationml/2006/main">
+  <p:cSld>
+    <p:spTree>
+      <p:nvGrpSpPr>
+        <p:cNvPr id="1" name=""/>
+        <p:cNvGrpSpPr/>
+        <p:nvPr/>
+      </p:nvGrpSpPr>
+      <p:grpSpPr>
+        <a:xfrm>
+          <a:off x="0" y="0"/>
+          <a:ext cx="0" cy="0"/>
+          <a:chOff x="0" y="0"/>
+          <a:chExt cx="0" cy="0"/>
+        </a:xfrm>
+      </p:grpSpPr>
+      <p:sp>
+        <p:nvSpPr>
+          <p:cNvPr id="2" name="Rubrik 1"/>
+          <p:cNvSpPr>
+            <a:spLocks noGrp="1"/>
+          </p:cNvSpPr>
+          <p:nvPr>
+            <p:ph type="title"/>
+          </p:nvPr>
+        </p:nvSpPr>
+        <p:spPr>
+          <a:xfrm>
+            <a:off x="481013" y="349250"/>
+            <a:ext cx="7543800" cy="1518739"/>
+          </a:xfrm>
+        </p:spPr>
+        <p:txBody>
+          <a:bodyPr/>
+          <a:lstStyle/>
+          <a:p>
+            <a:r>
+              <a:rPr lang="sv-SE" dirty="0" smtClean="0"/>
+              <a:t>Vanliga prioritering inom öppen källkod</a:t>
+            </a:r>
+            <a:endParaRPr lang="sv-SE" dirty="0"/>
+          </a:p>
+        </p:txBody>
+      </p:sp>
+      <p:sp>
+        <p:nvSpPr>
+          <p:cNvPr id="3" name="Platshållare för innehåll 2"/>
+          <p:cNvSpPr>
+            <a:spLocks noGrp="1"/>
+          </p:cNvSpPr>
+          <p:nvPr>
+            <p:ph idx="1"/>
+          </p:nvPr>
+        </p:nvSpPr>
+        <p:spPr>
+          <a:xfrm>
+            <a:off x="469900" y="2377440"/>
+            <a:ext cx="8229600" cy="3642360"/>
+          </a:xfrm>
+        </p:spPr>
+        <p:txBody>
+          <a:bodyPr/>
+          <a:lstStyle/>
+          <a:p>
+            <a:r>
+              <a:rPr lang="sv-SE" dirty="0" smtClean="0"/>
+              <a:t>Kvalitet framför features</a:t>
+            </a:r>
+          </a:p>
+          <a:p>
+            <a:r>
+              <a:rPr lang="sv-SE" dirty="0" smtClean="0"/>
+              <a:t>Ren teknisk design</a:t>
+            </a:r>
+          </a:p>
+        </p:txBody>
+      </p:sp>
+    </p:spTree>
+  </p:cSld>
+  <p:clrMapOvr>
+    <a:masterClrMapping/>
+  </p:clrMapOvr>
+</p:sld>
+</file>
+
+<file path=ppt/slides/slide21.xml><?xml version="1.0" encoding="utf-8"?>
+<p:sld xmlns:a="http://schemas.openxmlformats.org/drawingml/2006/main" xmlns:r="http://schemas.openxmlformats.org/officeDocument/2006/relationships" xmlns:p="http://schemas.openxmlformats.org/presentationml/2006/main">
+  <p:cSld>
+    <p:spTree>
+      <p:nvGrpSpPr>
+        <p:cNvPr id="1" name=""/>
+        <p:cNvGrpSpPr/>
+        <p:nvPr/>
+      </p:nvGrpSpPr>
+      <p:grpSpPr>
+        <a:xfrm>
+          <a:off x="0" y="0"/>
+          <a:ext cx="0" cy="0"/>
+          <a:chOff x="0" y="0"/>
+          <a:chExt cx="0" cy="0"/>
+        </a:xfrm>
+      </p:grpSpPr>
+      <p:sp>
+        <p:nvSpPr>
+          <p:cNvPr id="2" name="Rubrik 1"/>
+          <p:cNvSpPr>
+            <a:spLocks noGrp="1"/>
+          </p:cNvSpPr>
+          <p:nvPr>
+            <p:ph type="title"/>
+          </p:nvPr>
+        </p:nvSpPr>
+        <p:spPr>
+          <a:xfrm>
+            <a:off x="481013" y="349250"/>
+            <a:ext cx="7543800" cy="1518739"/>
+          </a:xfrm>
+        </p:spPr>
+        <p:txBody>
+          <a:bodyPr/>
+          <a:lstStyle/>
+          <a:p>
+            <a:r>
+              <a:rPr lang="sv-SE" dirty="0" smtClean="0"/>
+              <a:t>Vanliga prioritering inom öppen källkod</a:t>
+            </a:r>
+            <a:endParaRPr lang="sv-SE" dirty="0"/>
+          </a:p>
+        </p:txBody>
+      </p:sp>
+      <p:sp>
+        <p:nvSpPr>
+          <p:cNvPr id="3" name="Platshållare för innehåll 2"/>
+          <p:cNvSpPr>
+            <a:spLocks noGrp="1"/>
+          </p:cNvSpPr>
+          <p:nvPr>
+            <p:ph idx="1"/>
+          </p:nvPr>
+        </p:nvSpPr>
+        <p:spPr>
+          <a:xfrm>
+            <a:off x="469900" y="2377440"/>
+            <a:ext cx="8229600" cy="3642360"/>
+          </a:xfrm>
+        </p:spPr>
+        <p:txBody>
+          <a:bodyPr/>
+          <a:lstStyle/>
+          <a:p>
+            <a:r>
+              <a:rPr lang="sv-SE" dirty="0" smtClean="0"/>
+              <a:t>Kvalitet framför features</a:t>
+            </a:r>
+          </a:p>
+          <a:p>
+            <a:r>
+              <a:rPr lang="sv-SE" dirty="0" smtClean="0"/>
+              <a:t>Ren teknisk design</a:t>
+            </a:r>
+          </a:p>
+          <a:p>
+            <a:r>
+              <a:rPr lang="sv-SE" dirty="0" smtClean="0"/>
+              <a:t>Stabilitet</a:t>
+            </a:r>
+          </a:p>
+        </p:txBody>
+      </p:sp>
+    </p:spTree>
+  </p:cSld>
+  <p:clrMapOvr>
+    <a:masterClrMapping/>
+  </p:clrMapOvr>
+</p:sld>
+</file>
+
+<file path=ppt/slides/slide22.xml><?xml version="1.0" encoding="utf-8"?>
+<p:sld xmlns:a="http://schemas.openxmlformats.org/drawingml/2006/main" xmlns:r="http://schemas.openxmlformats.org/officeDocument/2006/relationships" xmlns:p="http://schemas.openxmlformats.org/presentationml/2006/main">
+  <p:cSld>
+    <p:spTree>
+      <p:nvGrpSpPr>
+        <p:cNvPr id="1" name=""/>
+        <p:cNvGrpSpPr/>
+        <p:nvPr/>
+      </p:nvGrpSpPr>
+      <p:grpSpPr>
+        <a:xfrm>
+          <a:off x="0" y="0"/>
+          <a:ext cx="0" cy="0"/>
+          <a:chOff x="0" y="0"/>
+          <a:chExt cx="0" cy="0"/>
+        </a:xfrm>
+      </p:grpSpPr>
+      <p:sp>
+        <p:nvSpPr>
+          <p:cNvPr id="2" name="Rubrik 1"/>
+          <p:cNvSpPr>
+            <a:spLocks noGrp="1"/>
+          </p:cNvSpPr>
+          <p:nvPr>
+            <p:ph type="title"/>
+          </p:nvPr>
+        </p:nvSpPr>
+        <p:spPr>
+          <a:xfrm>
+            <a:off x="481013" y="349250"/>
+            <a:ext cx="7543800" cy="1518739"/>
+          </a:xfrm>
+        </p:spPr>
+        <p:txBody>
+          <a:bodyPr/>
+          <a:lstStyle/>
+          <a:p>
+            <a:r>
+              <a:rPr lang="sv-SE" dirty="0" smtClean="0"/>
+              <a:t>Vanliga prioritering inom öppen källkod</a:t>
+            </a:r>
+            <a:endParaRPr lang="sv-SE" dirty="0"/>
+          </a:p>
+        </p:txBody>
+      </p:sp>
+      <p:sp>
+        <p:nvSpPr>
+          <p:cNvPr id="3" name="Platshållare för innehåll 2"/>
+          <p:cNvSpPr>
+            <a:spLocks noGrp="1"/>
+          </p:cNvSpPr>
+          <p:nvPr>
+            <p:ph idx="1"/>
+          </p:nvPr>
+        </p:nvSpPr>
+        <p:spPr>
+          <a:xfrm>
+            <a:off x="469900" y="2377440"/>
+            <a:ext cx="8229600" cy="3642360"/>
+          </a:xfrm>
+        </p:spPr>
+        <p:txBody>
+          <a:bodyPr/>
+          <a:lstStyle/>
+          <a:p>
+            <a:r>
+              <a:rPr lang="sv-SE" dirty="0" smtClean="0"/>
+              <a:t>Kvalitet framför features</a:t>
+            </a:r>
+          </a:p>
+          <a:p>
+            <a:r>
+              <a:rPr lang="sv-SE" dirty="0" smtClean="0"/>
+              <a:t>Ren teknisk design</a:t>
+            </a:r>
+          </a:p>
+          <a:p>
+            <a:r>
+              <a:rPr lang="sv-SE" dirty="0" smtClean="0"/>
+              <a:t>Stabilitet</a:t>
+            </a:r>
+          </a:p>
+          <a:p>
+            <a:r>
+              <a:rPr lang="sv-SE" dirty="0" smtClean="0"/>
+              <a:t>Följa standarder</a:t>
+            </a:r>
+            <a:endParaRPr lang="sv-SE" dirty="0"/>
+          </a:p>
+        </p:txBody>
+      </p:sp>
+    </p:spTree>
+  </p:cSld>
+  <p:clrMapOvr>
+    <a:masterClrMapping/>
+  </p:clrMapOvr>
+</p:sld>
+</file>
+
+<file path=ppt/slides/slide23.xml><?xml version="1.0" encoding="utf-8"?>
+<p:sld xmlns:a="http://schemas.openxmlformats.org/drawingml/2006/main" xmlns:r="http://schemas.openxmlformats.org/officeDocument/2006/relationships" xmlns:p="http://schemas.openxmlformats.org/presentationml/2006/main">
+  <p:cSld>
+    <p:spTree>
+      <p:nvGrpSpPr>
+        <p:cNvPr id="1" name=""/>
+        <p:cNvGrpSpPr/>
+        <p:nvPr/>
+      </p:nvGrpSpPr>
+      <p:grpSpPr>
+        <a:xfrm>
+          <a:off x="0" y="0"/>
+          <a:ext cx="0" cy="0"/>
+          <a:chOff x="0" y="0"/>
+          <a:chExt cx="0" cy="0"/>
+        </a:xfrm>
+      </p:grpSpPr>
+      <p:sp>
+        <p:nvSpPr>
+          <p:cNvPr id="2" name="Rubrik 1"/>
+          <p:cNvSpPr>
+            <a:spLocks noGrp="1"/>
+          </p:cNvSpPr>
+          <p:nvPr>
+            <p:ph type="title"/>
+          </p:nvPr>
+        </p:nvSpPr>
+        <p:spPr/>
+        <p:txBody>
+          <a:bodyPr/>
+          <a:lstStyle/>
+          <a:p>
+            <a:r>
+              <a:rPr lang="sv-SE" dirty="0" smtClean="0"/>
+              <a:t>Fördelar</a:t>
+            </a:r>
+            <a:endParaRPr lang="sv-SE" dirty="0"/>
+          </a:p>
+        </p:txBody>
+      </p:sp>
+      <p:sp>
+        <p:nvSpPr>
+          <p:cNvPr id="3" name="Platshållare för innehåll 2"/>
+          <p:cNvSpPr>
+            <a:spLocks noGrp="1"/>
+          </p:cNvSpPr>
+          <p:nvPr>
+            <p:ph idx="1"/>
+          </p:nvPr>
+        </p:nvSpPr>
+        <p:spPr/>
+        <p:txBody>
+          <a:bodyPr/>
+          <a:lstStyle/>
+          <a:p>
+            <a:endParaRPr lang="sv-SE" dirty="0"/>
+          </a:p>
+        </p:txBody>
+      </p:sp>
+    </p:spTree>
+  </p:cSld>
+  <p:clrMapOvr>
+    <a:masterClrMapping/>
+  </p:clrMapOvr>
+</p:sld>
+</file>
+
+<file path=ppt/slides/slide24.xml><?xml version="1.0" encoding="utf-8"?>
+<p:sld xmlns:a="http://schemas.openxmlformats.org/drawingml/2006/main" xmlns:r="http://schemas.openxmlformats.org/officeDocument/2006/relationships" xmlns:p="http://schemas.openxmlformats.org/presentationml/2006/main">
+  <p:cSld>
+    <p:spTree>
+      <p:nvGrpSpPr>
+        <p:cNvPr id="1" name=""/>
+        <p:cNvGrpSpPr/>
+        <p:nvPr/>
+      </p:nvGrpSpPr>
+      <p:grpSpPr>
+        <a:xfrm>
+          <a:off x="0" y="0"/>
+          <a:ext cx="0" cy="0"/>
+          <a:chOff x="0" y="0"/>
+          <a:chExt cx="0" cy="0"/>
+        </a:xfrm>
+      </p:grpSpPr>
+      <p:sp>
+        <p:nvSpPr>
+          <p:cNvPr id="2" name="Rubrik 1"/>
+          <p:cNvSpPr>
+            <a:spLocks noGrp="1"/>
+          </p:cNvSpPr>
+          <p:nvPr>
+            <p:ph type="title"/>
+          </p:nvPr>
+        </p:nvSpPr>
+        <p:spPr/>
+        <p:txBody>
+          <a:bodyPr/>
+          <a:lstStyle/>
+          <a:p>
+            <a:r>
+              <a:rPr lang="sv-SE" dirty="0" smtClean="0"/>
+              <a:t>Fördelar</a:t>
+            </a:r>
+            <a:endParaRPr lang="sv-SE" dirty="0"/>
+          </a:p>
+        </p:txBody>
+      </p:sp>
+      <p:sp>
+        <p:nvSpPr>
+          <p:cNvPr id="3" name="Platshållare för innehåll 2"/>
+          <p:cNvSpPr>
+            <a:spLocks noGrp="1"/>
+          </p:cNvSpPr>
+          <p:nvPr>
+            <p:ph idx="1"/>
+          </p:nvPr>
+        </p:nvSpPr>
+        <p:spPr/>
+        <p:txBody>
+          <a:bodyPr/>
+          <a:lstStyle/>
+          <a:p>
+            <a:r>
+              <a:rPr lang="sv-SE" dirty="0" smtClean="0"/>
+              <a:t>Öppen kod ger högre säkerhet (</a:t>
+            </a:r>
             <a:r>
               <a:rPr lang="sv-SE" dirty="0" err="1" smtClean="0"/>
-              <a:t>MySQL</a:t>
-            </a:r>
-            <a:r>
-              <a:rPr lang="sv-SE" dirty="0" smtClean="0"/>
-              <a:t> (Databas)</a:t>
-            </a:r>
-          </a:p>
-          <a:p>
+              <a:t>Jmfr</a:t>
+            </a:r>
+            <a:r>
+              <a:rPr lang="sv-SE" dirty="0" smtClean="0"/>
+              <a:t> Borland </a:t>
+            </a:r>
             <a:r>
               <a:rPr lang="sv-SE" dirty="0" err="1" smtClean="0"/>
-              <a:t>Firefox</a:t>
-            </a:r>
-            <a:r>
-              <a:rPr lang="sv-SE" dirty="0" smtClean="0"/>
-              <a:t> (Webbläsare)</a:t>
-            </a:r>
-          </a:p>
-          <a:p>
+              <a:t>Inprise</a:t>
+            </a:r>
+            <a:r>
+              <a:rPr lang="sv-SE" dirty="0" smtClean="0"/>
+              <a:t>)</a:t>
+            </a:r>
+          </a:p>
+        </p:txBody>
+      </p:sp>
+    </p:spTree>
+  </p:cSld>
+  <p:clrMapOvr>
+    <a:masterClrMapping/>
+  </p:clrMapOvr>
+</p:sld>
+</file>
+
+<file path=ppt/slides/slide25.xml><?xml version="1.0" encoding="utf-8"?>
+<p:sld xmlns:a="http://schemas.openxmlformats.org/drawingml/2006/main" xmlns:r="http://schemas.openxmlformats.org/officeDocument/2006/relationships" xmlns:p="http://schemas.openxmlformats.org/presentationml/2006/main">
+  <p:cSld>
+    <p:spTree>
+      <p:nvGrpSpPr>
+        <p:cNvPr id="1" name=""/>
+        <p:cNvGrpSpPr/>
+        <p:nvPr/>
+      </p:nvGrpSpPr>
+      <p:grpSpPr>
+        <a:xfrm>
+          <a:off x="0" y="0"/>
+          <a:ext cx="0" cy="0"/>
+          <a:chOff x="0" y="0"/>
+          <a:chExt cx="0" cy="0"/>
+        </a:xfrm>
+      </p:grpSpPr>
+      <p:sp>
+        <p:nvSpPr>
+          <p:cNvPr id="2" name="Rubrik 1"/>
+          <p:cNvSpPr>
+            <a:spLocks noGrp="1"/>
+          </p:cNvSpPr>
+          <p:nvPr>
+            <p:ph type="title"/>
+          </p:nvPr>
+        </p:nvSpPr>
+        <p:spPr/>
+        <p:txBody>
+          <a:bodyPr/>
+          <a:lstStyle/>
+          <a:p>
+            <a:r>
+              <a:rPr lang="sv-SE" dirty="0" smtClean="0"/>
+              <a:t>Fördelar</a:t>
+            </a:r>
             <a:endParaRPr lang="sv-SE" dirty="0"/>
+          </a:p>
+        </p:txBody>
+      </p:sp>
+      <p:sp>
+        <p:nvSpPr>
+          <p:cNvPr id="3" name="Platshållare för innehåll 2"/>
+          <p:cNvSpPr>
+            <a:spLocks noGrp="1"/>
+          </p:cNvSpPr>
+          <p:nvPr>
+            <p:ph idx="1"/>
+          </p:nvPr>
+        </p:nvSpPr>
+        <p:spPr/>
+        <p:txBody>
+          <a:bodyPr/>
+          <a:lstStyle/>
+          <a:p>
+            <a:r>
+              <a:rPr lang="sv-SE" dirty="0" smtClean="0"/>
+              <a:t>Öppen kod ger högre säkerhet (</a:t>
+            </a:r>
+            <a:r>
+              <a:rPr lang="sv-SE" dirty="0" err="1" smtClean="0"/>
+              <a:t>Jmfr</a:t>
+            </a:r>
+            <a:r>
+              <a:rPr lang="sv-SE" dirty="0" smtClean="0"/>
+              <a:t> Borland </a:t>
+            </a:r>
+            <a:r>
+              <a:rPr lang="sv-SE" dirty="0" err="1" smtClean="0"/>
+              <a:t>Inprise</a:t>
+            </a:r>
+            <a:r>
+              <a:rPr lang="sv-SE" dirty="0" smtClean="0"/>
+              <a:t>)</a:t>
+            </a:r>
+          </a:p>
+          <a:p>
+            <a:r>
+              <a:rPr lang="sv-SE" dirty="0" smtClean="0"/>
+              <a:t>Standarder ger större flexibilitet</a:t>
+            </a:r>
+          </a:p>
+        </p:txBody>
+      </p:sp>
+    </p:spTree>
+  </p:cSld>
+  <p:clrMapOvr>
+    <a:masterClrMapping/>
+  </p:clrMapOvr>
+</p:sld>
+</file>
+
+<file path=ppt/slides/slide26.xml><?xml version="1.0" encoding="utf-8"?>
+<p:sld xmlns:a="http://schemas.openxmlformats.org/drawingml/2006/main" xmlns:r="http://schemas.openxmlformats.org/officeDocument/2006/relationships" xmlns:p="http://schemas.openxmlformats.org/presentationml/2006/main">
+  <p:cSld>
+    <p:spTree>
+      <p:nvGrpSpPr>
+        <p:cNvPr id="1" name=""/>
+        <p:cNvGrpSpPr/>
+        <p:nvPr/>
+      </p:nvGrpSpPr>
+      <p:grpSpPr>
+        <a:xfrm>
+          <a:off x="0" y="0"/>
+          <a:ext cx="0" cy="0"/>
+          <a:chOff x="0" y="0"/>
+          <a:chExt cx="0" cy="0"/>
+        </a:xfrm>
+      </p:grpSpPr>
+      <p:sp>
+        <p:nvSpPr>
+          <p:cNvPr id="2" name="Rubrik 1"/>
+          <p:cNvSpPr>
+            <a:spLocks noGrp="1"/>
+          </p:cNvSpPr>
+          <p:nvPr>
+            <p:ph type="title"/>
+          </p:nvPr>
+        </p:nvSpPr>
+        <p:spPr/>
+        <p:txBody>
+          <a:bodyPr/>
+          <a:lstStyle/>
+          <a:p>
+            <a:r>
+              <a:rPr lang="sv-SE" dirty="0" smtClean="0"/>
+              <a:t>Fördelar</a:t>
+            </a:r>
+            <a:endParaRPr lang="sv-SE" dirty="0"/>
+          </a:p>
+        </p:txBody>
+      </p:sp>
+      <p:sp>
+        <p:nvSpPr>
+          <p:cNvPr id="3" name="Platshållare för innehåll 2"/>
+          <p:cNvSpPr>
+            <a:spLocks noGrp="1"/>
+          </p:cNvSpPr>
+          <p:nvPr>
+            <p:ph idx="1"/>
+          </p:nvPr>
+        </p:nvSpPr>
+        <p:spPr/>
+        <p:txBody>
+          <a:bodyPr/>
+          <a:lstStyle/>
+          <a:p>
+            <a:r>
+              <a:rPr lang="sv-SE" dirty="0" smtClean="0"/>
+              <a:t>Öppen kod ger högre säkerhet (</a:t>
+            </a:r>
+            <a:r>
+              <a:rPr lang="sv-SE" dirty="0" err="1" smtClean="0"/>
+              <a:t>Jmfr</a:t>
+            </a:r>
+            <a:r>
+              <a:rPr lang="sv-SE" dirty="0" smtClean="0"/>
+              <a:t> Borland </a:t>
+            </a:r>
+            <a:r>
+              <a:rPr lang="sv-SE" dirty="0" err="1" smtClean="0"/>
+              <a:t>Inprise</a:t>
+            </a:r>
+            <a:r>
+              <a:rPr lang="sv-SE" dirty="0" smtClean="0"/>
+              <a:t>)</a:t>
+            </a:r>
+          </a:p>
+          <a:p>
+            <a:r>
+              <a:rPr lang="sv-SE" dirty="0" smtClean="0"/>
+              <a:t>Standarder ger större flexibilitet</a:t>
+            </a:r>
+          </a:p>
+          <a:p>
+            <a:r>
+              <a:rPr lang="sv-SE" dirty="0" smtClean="0"/>
+              <a:t>Ren design gör det lättare att läsa, förstå och bygga vidare på produkten</a:t>
+            </a:r>
+            <a:endParaRPr lang="sv-SE" dirty="0"/>
+          </a:p>
+        </p:txBody>
+      </p:sp>
+    </p:spTree>
+  </p:cSld>
+  <p:clrMapOvr>
+    <a:masterClrMapping/>
+  </p:clrMapOvr>
+</p:sld>
+</file>
+
+<file path=ppt/slides/slide27.xml><?xml version="1.0" encoding="utf-8"?>
+<p:sld xmlns:a="http://schemas.openxmlformats.org/drawingml/2006/main" xmlns:r="http://schemas.openxmlformats.org/officeDocument/2006/relationships" xmlns:p="http://schemas.openxmlformats.org/presentationml/2006/main">
+  <p:cSld>
+    <p:spTree>
+      <p:nvGrpSpPr>
+        <p:cNvPr id="1" name=""/>
+        <p:cNvGrpSpPr/>
+        <p:nvPr/>
+      </p:nvGrpSpPr>
+      <p:grpSpPr>
+        <a:xfrm>
+          <a:off x="0" y="0"/>
+          <a:ext cx="0" cy="0"/>
+          <a:chOff x="0" y="0"/>
+          <a:chExt cx="0" cy="0"/>
+        </a:xfrm>
+      </p:grpSpPr>
+      <p:sp>
+        <p:nvSpPr>
+          <p:cNvPr id="2" name="Rubrik 1"/>
+          <p:cNvSpPr>
+            <a:spLocks noGrp="1"/>
+          </p:cNvSpPr>
+          <p:nvPr>
+            <p:ph type="title"/>
+          </p:nvPr>
+        </p:nvSpPr>
+        <p:spPr/>
+        <p:txBody>
+          <a:bodyPr/>
+          <a:lstStyle/>
+          <a:p>
+            <a:r>
+              <a:rPr lang="sv-SE" dirty="0" smtClean="0"/>
+              <a:t>Fördelar för verksamheten</a:t>
+            </a:r>
+            <a:endParaRPr lang="sv-SE" dirty="0"/>
+          </a:p>
+        </p:txBody>
+      </p:sp>
+      <p:sp>
+        <p:nvSpPr>
+          <p:cNvPr id="3" name="Platshållare för innehåll 2"/>
+          <p:cNvSpPr>
+            <a:spLocks noGrp="1"/>
+          </p:cNvSpPr>
+          <p:nvPr>
+            <p:ph idx="1"/>
+          </p:nvPr>
+        </p:nvSpPr>
+        <p:spPr/>
+        <p:txBody>
+          <a:bodyPr/>
+          <a:lstStyle/>
+          <a:p>
+            <a:endParaRPr lang="sv-SE" dirty="0"/>
+          </a:p>
+        </p:txBody>
+      </p:sp>
+    </p:spTree>
+  </p:cSld>
+  <p:clrMapOvr>
+    <a:masterClrMapping/>
+  </p:clrMapOvr>
+</p:sld>
+</file>
+
+<file path=ppt/slides/slide28.xml><?xml version="1.0" encoding="utf-8"?>
+<p:sld xmlns:a="http://schemas.openxmlformats.org/drawingml/2006/main" xmlns:r="http://schemas.openxmlformats.org/officeDocument/2006/relationships" xmlns:p="http://schemas.openxmlformats.org/presentationml/2006/main">
+  <p:cSld>
+    <p:spTree>
+      <p:nvGrpSpPr>
+        <p:cNvPr id="1" name=""/>
+        <p:cNvGrpSpPr/>
+        <p:nvPr/>
+      </p:nvGrpSpPr>
+      <p:grpSpPr>
+        <a:xfrm>
+          <a:off x="0" y="0"/>
+          <a:ext cx="0" cy="0"/>
+          <a:chOff x="0" y="0"/>
+          <a:chExt cx="0" cy="0"/>
+        </a:xfrm>
+      </p:grpSpPr>
+      <p:sp>
+        <p:nvSpPr>
+          <p:cNvPr id="2" name="Rubrik 1"/>
+          <p:cNvSpPr>
+            <a:spLocks noGrp="1"/>
+          </p:cNvSpPr>
+          <p:nvPr>
+            <p:ph type="title"/>
+          </p:nvPr>
+        </p:nvSpPr>
+        <p:spPr/>
+        <p:txBody>
+          <a:bodyPr/>
+          <a:lstStyle/>
+          <a:p>
+            <a:r>
+              <a:rPr lang="sv-SE" dirty="0" smtClean="0"/>
+              <a:t>Fördelar för verksamheten</a:t>
+            </a:r>
+            <a:endParaRPr lang="sv-SE" dirty="0"/>
+          </a:p>
+        </p:txBody>
+      </p:sp>
+      <p:sp>
+        <p:nvSpPr>
+          <p:cNvPr id="3" name="Platshållare för innehåll 2"/>
+          <p:cNvSpPr>
+            <a:spLocks noGrp="1"/>
+          </p:cNvSpPr>
+          <p:nvPr>
+            <p:ph idx="1"/>
+          </p:nvPr>
+        </p:nvSpPr>
+        <p:spPr/>
+        <p:txBody>
+          <a:bodyPr/>
+          <a:lstStyle/>
+          <a:p>
+            <a:r>
+              <a:rPr lang="sv-SE" dirty="0" smtClean="0"/>
+              <a:t>Gratis inköp (Påverkar total </a:t>
+            </a:r>
+            <a:r>
+              <a:rPr lang="sv-SE" dirty="0" err="1" smtClean="0"/>
+              <a:t>cost</a:t>
+            </a:r>
+            <a:r>
+              <a:rPr lang="sv-SE" dirty="0" smtClean="0"/>
+              <a:t> of </a:t>
+            </a:r>
+            <a:r>
+              <a:rPr lang="sv-SE" dirty="0" err="1" smtClean="0"/>
+              <a:t>ownership</a:t>
+            </a:r>
+            <a:r>
+              <a:rPr lang="sv-SE" dirty="0" smtClean="0"/>
+              <a:t>)</a:t>
+            </a:r>
+          </a:p>
+        </p:txBody>
+      </p:sp>
+    </p:spTree>
+  </p:cSld>
+  <p:clrMapOvr>
+    <a:masterClrMapping/>
+  </p:clrMapOvr>
+</p:sld>
+</file>
+
+<file path=ppt/slides/slide29.xml><?xml version="1.0" encoding="utf-8"?>
+<p:sld xmlns:a="http://schemas.openxmlformats.org/drawingml/2006/main" xmlns:r="http://schemas.openxmlformats.org/officeDocument/2006/relationships" xmlns:p="http://schemas.openxmlformats.org/presentationml/2006/main">
+  <p:cSld>
+    <p:spTree>
+      <p:nvGrpSpPr>
+        <p:cNvPr id="1" name=""/>
+        <p:cNvGrpSpPr/>
+        <p:nvPr/>
+      </p:nvGrpSpPr>
+      <p:grpSpPr>
+        <a:xfrm>
+          <a:off x="0" y="0"/>
+          <a:ext cx="0" cy="0"/>
+          <a:chOff x="0" y="0"/>
+          <a:chExt cx="0" cy="0"/>
+        </a:xfrm>
+      </p:grpSpPr>
+      <p:sp>
+        <p:nvSpPr>
+          <p:cNvPr id="2" name="Rubrik 1"/>
+          <p:cNvSpPr>
+            <a:spLocks noGrp="1"/>
+          </p:cNvSpPr>
+          <p:nvPr>
+            <p:ph type="title"/>
+          </p:nvPr>
+        </p:nvSpPr>
+        <p:spPr/>
+        <p:txBody>
+          <a:bodyPr/>
+          <a:lstStyle/>
+          <a:p>
+            <a:r>
+              <a:rPr lang="sv-SE" dirty="0" smtClean="0"/>
+              <a:t>Fördelar för verksamheten</a:t>
+            </a:r>
+            <a:endParaRPr lang="sv-SE" dirty="0"/>
+          </a:p>
+        </p:txBody>
+      </p:sp>
+      <p:sp>
+        <p:nvSpPr>
+          <p:cNvPr id="3" name="Platshållare för innehåll 2"/>
+          <p:cNvSpPr>
+            <a:spLocks noGrp="1"/>
+          </p:cNvSpPr>
+          <p:nvPr>
+            <p:ph idx="1"/>
+          </p:nvPr>
+        </p:nvSpPr>
+        <p:spPr/>
+        <p:txBody>
+          <a:bodyPr/>
+          <a:lstStyle/>
+          <a:p>
+            <a:r>
+              <a:rPr lang="sv-SE" dirty="0" smtClean="0"/>
+              <a:t>Gratis inköp (Påverkar total </a:t>
+            </a:r>
+            <a:r>
+              <a:rPr lang="sv-SE" dirty="0" err="1" smtClean="0"/>
+              <a:t>cost</a:t>
+            </a:r>
+            <a:r>
+              <a:rPr lang="sv-SE" dirty="0" smtClean="0"/>
+              <a:t> of </a:t>
+            </a:r>
+            <a:r>
+              <a:rPr lang="sv-SE" dirty="0" err="1" smtClean="0"/>
+              <a:t>ownership</a:t>
+            </a:r>
+            <a:r>
+              <a:rPr lang="sv-SE" dirty="0" smtClean="0"/>
+              <a:t>)</a:t>
+            </a:r>
+          </a:p>
+          <a:p>
+            <a:r>
+              <a:rPr lang="sv-SE" dirty="0" smtClean="0"/>
+              <a:t>Betala bara för det du behöver</a:t>
+            </a:r>
           </a:p>
         </p:txBody>
       </p:sp>
@@ -4739,11 +6162,179 @@
           <a:p>
             <a:r>
               <a:rPr lang="sv-SE" dirty="0" smtClean="0"/>
-              <a:t>Företag inom Open </a:t>
+              <a:t>Exempel</a:t>
+            </a:r>
+            <a:endParaRPr lang="sv-SE" dirty="0"/>
+          </a:p>
+        </p:txBody>
+      </p:sp>
+      <p:sp>
+        <p:nvSpPr>
+          <p:cNvPr id="3" name="Platshållare för innehåll 2"/>
+          <p:cNvSpPr>
+            <a:spLocks noGrp="1"/>
+          </p:cNvSpPr>
+          <p:nvPr>
+            <p:ph idx="1"/>
+          </p:nvPr>
+        </p:nvSpPr>
+        <p:spPr/>
+        <p:txBody>
+          <a:bodyPr/>
+          <a:lstStyle/>
+          <a:p>
+            <a:endParaRPr lang="sv-SE" dirty="0"/>
+          </a:p>
+        </p:txBody>
+      </p:sp>
+    </p:spTree>
+  </p:cSld>
+  <p:clrMapOvr>
+    <a:masterClrMapping/>
+  </p:clrMapOvr>
+  <p:timing>
+    <p:tnLst>
+      <p:par>
+        <p:cTn id="1" dur="indefinite" restart="never" nodeType="tmRoot"/>
+      </p:par>
+    </p:tnLst>
+  </p:timing>
+</p:sld>
+</file>
+
+<file path=ppt/slides/slide30.xml><?xml version="1.0" encoding="utf-8"?>
+<p:sld xmlns:a="http://schemas.openxmlformats.org/drawingml/2006/main" xmlns:r="http://schemas.openxmlformats.org/officeDocument/2006/relationships" xmlns:p="http://schemas.openxmlformats.org/presentationml/2006/main">
+  <p:cSld>
+    <p:spTree>
+      <p:nvGrpSpPr>
+        <p:cNvPr id="1" name=""/>
+        <p:cNvGrpSpPr/>
+        <p:nvPr/>
+      </p:nvGrpSpPr>
+      <p:grpSpPr>
+        <a:xfrm>
+          <a:off x="0" y="0"/>
+          <a:ext cx="0" cy="0"/>
+          <a:chOff x="0" y="0"/>
+          <a:chExt cx="0" cy="0"/>
+        </a:xfrm>
+      </p:grpSpPr>
+      <p:sp>
+        <p:nvSpPr>
+          <p:cNvPr id="2" name="Rubrik 1"/>
+          <p:cNvSpPr>
+            <a:spLocks noGrp="1"/>
+          </p:cNvSpPr>
+          <p:nvPr>
+            <p:ph type="title"/>
+          </p:nvPr>
+        </p:nvSpPr>
+        <p:spPr/>
+        <p:txBody>
+          <a:bodyPr/>
+          <a:lstStyle/>
+          <a:p>
+            <a:r>
+              <a:rPr lang="sv-SE" dirty="0" smtClean="0"/>
+              <a:t>Fördelar för verksamheten</a:t>
+            </a:r>
+            <a:endParaRPr lang="sv-SE" dirty="0"/>
+          </a:p>
+        </p:txBody>
+      </p:sp>
+      <p:sp>
+        <p:nvSpPr>
+          <p:cNvPr id="3" name="Platshållare för innehåll 2"/>
+          <p:cNvSpPr>
+            <a:spLocks noGrp="1"/>
+          </p:cNvSpPr>
+          <p:nvPr>
+            <p:ph idx="1"/>
+          </p:nvPr>
+        </p:nvSpPr>
+        <p:spPr/>
+        <p:txBody>
+          <a:bodyPr/>
+          <a:lstStyle/>
+          <a:p>
+            <a:r>
+              <a:rPr lang="sv-SE" dirty="0" smtClean="0"/>
+              <a:t>Gratis inköp (Påverkar total </a:t>
             </a:r>
             <a:r>
               <a:rPr lang="sv-SE" dirty="0" err="1" smtClean="0"/>
-              <a:t>Source</a:t>
+              <a:t>cost</a:t>
+            </a:r>
+            <a:r>
+              <a:rPr lang="sv-SE" dirty="0" smtClean="0"/>
+              <a:t> of </a:t>
+            </a:r>
+            <a:r>
+              <a:rPr lang="sv-SE" dirty="0" err="1" smtClean="0"/>
+              <a:t>ownership</a:t>
+            </a:r>
+            <a:r>
+              <a:rPr lang="sv-SE" dirty="0" smtClean="0"/>
+              <a:t>)</a:t>
+            </a:r>
+          </a:p>
+          <a:p>
+            <a:r>
+              <a:rPr lang="sv-SE" dirty="0" smtClean="0"/>
+              <a:t>Betala bara för det du behöver</a:t>
+            </a:r>
+          </a:p>
+          <a:p>
+            <a:r>
+              <a:rPr lang="sv-SE" dirty="0" smtClean="0"/>
+              <a:t>Obegränsat antal kopior av programvara</a:t>
+            </a:r>
+          </a:p>
+        </p:txBody>
+      </p:sp>
+    </p:spTree>
+  </p:cSld>
+  <p:clrMapOvr>
+    <a:masterClrMapping/>
+  </p:clrMapOvr>
+</p:sld>
+</file>
+
+<file path=ppt/slides/slide31.xml><?xml version="1.0" encoding="utf-8"?>
+<p:sld xmlns:a="http://schemas.openxmlformats.org/drawingml/2006/main" xmlns:r="http://schemas.openxmlformats.org/officeDocument/2006/relationships" xmlns:p="http://schemas.openxmlformats.org/presentationml/2006/main">
+  <p:cSld>
+    <p:spTree>
+      <p:nvGrpSpPr>
+        <p:cNvPr id="1" name=""/>
+        <p:cNvGrpSpPr/>
+        <p:nvPr/>
+      </p:nvGrpSpPr>
+      <p:grpSpPr>
+        <a:xfrm>
+          <a:off x="0" y="0"/>
+          <a:ext cx="0" cy="0"/>
+          <a:chOff x="0" y="0"/>
+          <a:chExt cx="0" cy="0"/>
+        </a:xfrm>
+      </p:grpSpPr>
+      <p:sp>
+        <p:nvSpPr>
+          <p:cNvPr id="2" name="Rubrik 1"/>
+          <p:cNvSpPr>
+            <a:spLocks noGrp="1"/>
+          </p:cNvSpPr>
+          <p:nvPr>
+            <p:ph type="title"/>
+          </p:nvPr>
+        </p:nvSpPr>
+        <p:spPr/>
+        <p:txBody>
+          <a:bodyPr/>
+          <a:lstStyle/>
+          <a:p>
+            <a:r>
+              <a:rPr lang="sv-SE" dirty="0" smtClean="0"/>
+              <a:t>Fördelar för verksamheten</a:t>
             </a:r>
             <a:endParaRPr lang="sv-SE" dirty="0"/>
           </a:p>
@@ -4766,27 +6357,771 @@
           <a:p>
             <a:r>
               <a:rPr lang="sv-SE" dirty="0" smtClean="0"/>
-              <a:t>Apache Software Foundation</a:t>
-            </a:r>
-          </a:p>
-          <a:p>
+              <a:t>Gratis inköp (Påverkar total </a:t>
+            </a:r>
             <a:r>
               <a:rPr lang="sv-SE" dirty="0" err="1" smtClean="0"/>
-              <a:t>JBoss</a:t>
-            </a:r>
+              <a:t>cost</a:t>
+            </a:r>
+            <a:r>
+              <a:rPr lang="sv-SE" dirty="0" smtClean="0"/>
+              <a:t> of </a:t>
+            </a:r>
+            <a:r>
+              <a:rPr lang="sv-SE" dirty="0" err="1" smtClean="0"/>
+              <a:t>ownership</a:t>
+            </a:r>
+            <a:r>
+              <a:rPr lang="sv-SE" dirty="0" smtClean="0"/>
+              <a:t>)</a:t>
+            </a:r>
+          </a:p>
+          <a:p>
+            <a:r>
+              <a:rPr lang="sv-SE" dirty="0" smtClean="0"/>
+              <a:t>Betala bara för det du behöver</a:t>
+            </a:r>
+          </a:p>
+          <a:p>
+            <a:r>
+              <a:rPr lang="sv-SE" dirty="0" smtClean="0"/>
+              <a:t>Obegränsat antal kopior av programvara</a:t>
+            </a:r>
+          </a:p>
+          <a:p>
+            <a:r>
+              <a:rPr lang="sv-SE" dirty="0" smtClean="0"/>
+              <a:t>Lägre krav att uppgradera</a:t>
+            </a:r>
+          </a:p>
+        </p:txBody>
+      </p:sp>
+    </p:spTree>
+  </p:cSld>
+  <p:clrMapOvr>
+    <a:masterClrMapping/>
+  </p:clrMapOvr>
+</p:sld>
+</file>
+
+<file path=ppt/slides/slide32.xml><?xml version="1.0" encoding="utf-8"?>
+<p:sld xmlns:a="http://schemas.openxmlformats.org/drawingml/2006/main" xmlns:r="http://schemas.openxmlformats.org/officeDocument/2006/relationships" xmlns:p="http://schemas.openxmlformats.org/presentationml/2006/main">
+  <p:cSld>
+    <p:spTree>
+      <p:nvGrpSpPr>
+        <p:cNvPr id="1" name=""/>
+        <p:cNvGrpSpPr/>
+        <p:nvPr/>
+      </p:nvGrpSpPr>
+      <p:grpSpPr>
+        <a:xfrm>
+          <a:off x="0" y="0"/>
+          <a:ext cx="0" cy="0"/>
+          <a:chOff x="0" y="0"/>
+          <a:chExt cx="0" cy="0"/>
+        </a:xfrm>
+      </p:grpSpPr>
+      <p:sp>
+        <p:nvSpPr>
+          <p:cNvPr id="2" name="Rubrik 1"/>
+          <p:cNvSpPr>
+            <a:spLocks noGrp="1"/>
+          </p:cNvSpPr>
+          <p:nvPr>
+            <p:ph type="title"/>
+          </p:nvPr>
+        </p:nvSpPr>
+        <p:spPr/>
+        <p:txBody>
+          <a:bodyPr/>
+          <a:lstStyle/>
+          <a:p>
+            <a:r>
+              <a:rPr lang="sv-SE" dirty="0" smtClean="0"/>
+              <a:t>Fördelar för verksamheten</a:t>
+            </a:r>
+            <a:endParaRPr lang="sv-SE" dirty="0"/>
+          </a:p>
+        </p:txBody>
+      </p:sp>
+      <p:sp>
+        <p:nvSpPr>
+          <p:cNvPr id="3" name="Platshållare för innehåll 2"/>
+          <p:cNvSpPr>
+            <a:spLocks noGrp="1"/>
+          </p:cNvSpPr>
+          <p:nvPr>
+            <p:ph idx="1"/>
+          </p:nvPr>
+        </p:nvSpPr>
+        <p:spPr/>
+        <p:txBody>
+          <a:bodyPr/>
+          <a:lstStyle/>
+          <a:p>
+            <a:r>
+              <a:rPr lang="sv-SE" dirty="0" smtClean="0"/>
+              <a:t>Gratis inköp (Påverkar total </a:t>
+            </a:r>
+            <a:r>
+              <a:rPr lang="sv-SE" dirty="0" err="1" smtClean="0"/>
+              <a:t>cost</a:t>
+            </a:r>
+            <a:r>
+              <a:rPr lang="sv-SE" dirty="0" smtClean="0"/>
+              <a:t> of </a:t>
+            </a:r>
+            <a:r>
+              <a:rPr lang="sv-SE" dirty="0" err="1" smtClean="0"/>
+              <a:t>ownership</a:t>
+            </a:r>
+            <a:r>
+              <a:rPr lang="sv-SE" dirty="0" smtClean="0"/>
+              <a:t>)</a:t>
+            </a:r>
+          </a:p>
+          <a:p>
+            <a:r>
+              <a:rPr lang="sv-SE" dirty="0" smtClean="0"/>
+              <a:t>Betala bara för det du behöver</a:t>
+            </a:r>
+          </a:p>
+          <a:p>
+            <a:r>
+              <a:rPr lang="sv-SE" dirty="0" smtClean="0"/>
+              <a:t>Obegränsat antal kopior av programvara</a:t>
+            </a:r>
+          </a:p>
+          <a:p>
+            <a:r>
+              <a:rPr lang="sv-SE" dirty="0" smtClean="0"/>
+              <a:t>Lägre krav att uppgradera</a:t>
+            </a:r>
+          </a:p>
+          <a:p>
+            <a:r>
+              <a:rPr lang="sv-SE" dirty="0" smtClean="0"/>
+              <a:t>Obefintlig risk för virus</a:t>
+            </a:r>
+          </a:p>
+        </p:txBody>
+      </p:sp>
+    </p:spTree>
+  </p:cSld>
+  <p:clrMapOvr>
+    <a:masterClrMapping/>
+  </p:clrMapOvr>
+</p:sld>
+</file>
+
+<file path=ppt/slides/slide33.xml><?xml version="1.0" encoding="utf-8"?>
+<p:sld xmlns:a="http://schemas.openxmlformats.org/drawingml/2006/main" xmlns:r="http://schemas.openxmlformats.org/officeDocument/2006/relationships" xmlns:p="http://schemas.openxmlformats.org/presentationml/2006/main">
+  <p:cSld>
+    <p:spTree>
+      <p:nvGrpSpPr>
+        <p:cNvPr id="1" name=""/>
+        <p:cNvGrpSpPr/>
+        <p:nvPr/>
+      </p:nvGrpSpPr>
+      <p:grpSpPr>
+        <a:xfrm>
+          <a:off x="0" y="0"/>
+          <a:ext cx="0" cy="0"/>
+          <a:chOff x="0" y="0"/>
+          <a:chExt cx="0" cy="0"/>
+        </a:xfrm>
+      </p:grpSpPr>
+      <p:sp>
+        <p:nvSpPr>
+          <p:cNvPr id="2" name="Rubrik 1"/>
+          <p:cNvSpPr>
+            <a:spLocks noGrp="1"/>
+          </p:cNvSpPr>
+          <p:nvPr>
+            <p:ph type="title"/>
+          </p:nvPr>
+        </p:nvSpPr>
+        <p:spPr/>
+        <p:txBody>
+          <a:bodyPr/>
+          <a:lstStyle/>
+          <a:p>
+            <a:r>
+              <a:rPr lang="sv-SE" dirty="0" smtClean="0"/>
+              <a:t>Fördelar för verksamheten</a:t>
+            </a:r>
+            <a:endParaRPr lang="sv-SE" dirty="0"/>
+          </a:p>
+        </p:txBody>
+      </p:sp>
+      <p:sp>
+        <p:nvSpPr>
+          <p:cNvPr id="3" name="Platshållare för innehåll 2"/>
+          <p:cNvSpPr>
+            <a:spLocks noGrp="1"/>
+          </p:cNvSpPr>
+          <p:nvPr>
+            <p:ph idx="1"/>
+          </p:nvPr>
+        </p:nvSpPr>
+        <p:spPr/>
+        <p:txBody>
+          <a:bodyPr/>
+          <a:lstStyle/>
+          <a:p>
+            <a:r>
+              <a:rPr lang="sv-SE" dirty="0" smtClean="0"/>
+              <a:t>Gratis inköp (Påverkar total </a:t>
+            </a:r>
+            <a:r>
+              <a:rPr lang="sv-SE" dirty="0" err="1" smtClean="0"/>
+              <a:t>cost</a:t>
+            </a:r>
+            <a:r>
+              <a:rPr lang="sv-SE" dirty="0" smtClean="0"/>
+              <a:t> of </a:t>
+            </a:r>
+            <a:r>
+              <a:rPr lang="sv-SE" dirty="0" err="1" smtClean="0"/>
+              <a:t>ownership</a:t>
+            </a:r>
+            <a:r>
+              <a:rPr lang="sv-SE" dirty="0" smtClean="0"/>
+              <a:t>)</a:t>
+            </a:r>
+          </a:p>
+          <a:p>
+            <a:r>
+              <a:rPr lang="sv-SE" dirty="0" smtClean="0"/>
+              <a:t>Betala bara för det du behöver</a:t>
+            </a:r>
+          </a:p>
+          <a:p>
+            <a:r>
+              <a:rPr lang="sv-SE" dirty="0" smtClean="0"/>
+              <a:t>Obegränsat antal kopior av programvara</a:t>
+            </a:r>
+          </a:p>
+          <a:p>
+            <a:r>
+              <a:rPr lang="sv-SE" dirty="0" smtClean="0"/>
+              <a:t>Lägre krav att uppgradera</a:t>
+            </a:r>
+          </a:p>
+          <a:p>
+            <a:r>
+              <a:rPr lang="sv-SE" dirty="0" smtClean="0"/>
+              <a:t>Obefintlig risk för virus</a:t>
+            </a:r>
+          </a:p>
+          <a:p>
+            <a:r>
+              <a:rPr lang="sv-SE" dirty="0" smtClean="0"/>
+              <a:t>Minskar risken att låsa sig vid programvaror från ett företag</a:t>
+            </a:r>
+            <a:endParaRPr lang="sv-SE" dirty="0"/>
+          </a:p>
+        </p:txBody>
+      </p:sp>
+    </p:spTree>
+  </p:cSld>
+  <p:clrMapOvr>
+    <a:masterClrMapping/>
+  </p:clrMapOvr>
+</p:sld>
+</file>
+
+<file path=ppt/slides/slide34.xml><?xml version="1.0" encoding="utf-8"?>
+<p:sld xmlns:a="http://schemas.openxmlformats.org/drawingml/2006/main" xmlns:r="http://schemas.openxmlformats.org/officeDocument/2006/relationships" xmlns:p="http://schemas.openxmlformats.org/presentationml/2006/main">
+  <p:cSld>
+    <p:spTree>
+      <p:nvGrpSpPr>
+        <p:cNvPr id="1" name=""/>
+        <p:cNvGrpSpPr/>
+        <p:nvPr/>
+      </p:nvGrpSpPr>
+      <p:grpSpPr>
+        <a:xfrm>
+          <a:off x="0" y="0"/>
+          <a:ext cx="0" cy="0"/>
+          <a:chOff x="0" y="0"/>
+          <a:chExt cx="0" cy="0"/>
+        </a:xfrm>
+      </p:grpSpPr>
+      <p:sp>
+        <p:nvSpPr>
+          <p:cNvPr id="2" name="Rubrik 1"/>
+          <p:cNvSpPr>
+            <a:spLocks noGrp="1"/>
+          </p:cNvSpPr>
+          <p:nvPr>
+            <p:ph type="title"/>
+          </p:nvPr>
+        </p:nvSpPr>
+        <p:spPr/>
+        <p:txBody>
+          <a:bodyPr/>
+          <a:lstStyle/>
+          <a:p>
+            <a:r>
+              <a:rPr lang="sv-SE" dirty="0" smtClean="0"/>
+              <a:t>Kommunikation</a:t>
+            </a:r>
+            <a:endParaRPr lang="sv-SE" dirty="0"/>
+          </a:p>
+        </p:txBody>
+      </p:sp>
+      <p:sp>
+        <p:nvSpPr>
+          <p:cNvPr id="3" name="Platshållare för innehåll 2"/>
+          <p:cNvSpPr>
+            <a:spLocks noGrp="1"/>
+          </p:cNvSpPr>
+          <p:nvPr>
+            <p:ph idx="1"/>
+          </p:nvPr>
+        </p:nvSpPr>
+        <p:spPr/>
+        <p:txBody>
+          <a:bodyPr/>
+          <a:lstStyle/>
+          <a:p>
+            <a:endParaRPr lang="sv-SE" dirty="0"/>
+          </a:p>
+        </p:txBody>
+      </p:sp>
+    </p:spTree>
+  </p:cSld>
+  <p:clrMapOvr>
+    <a:masterClrMapping/>
+  </p:clrMapOvr>
+</p:sld>
+</file>
+
+<file path=ppt/slides/slide35.xml><?xml version="1.0" encoding="utf-8"?>
+<p:sld xmlns:a="http://schemas.openxmlformats.org/drawingml/2006/main" xmlns:r="http://schemas.openxmlformats.org/officeDocument/2006/relationships" xmlns:p="http://schemas.openxmlformats.org/presentationml/2006/main">
+  <p:cSld>
+    <p:spTree>
+      <p:nvGrpSpPr>
+        <p:cNvPr id="1" name=""/>
+        <p:cNvGrpSpPr/>
+        <p:nvPr/>
+      </p:nvGrpSpPr>
+      <p:grpSpPr>
+        <a:xfrm>
+          <a:off x="0" y="0"/>
+          <a:ext cx="0" cy="0"/>
+          <a:chOff x="0" y="0"/>
+          <a:chExt cx="0" cy="0"/>
+        </a:xfrm>
+      </p:grpSpPr>
+      <p:sp>
+        <p:nvSpPr>
+          <p:cNvPr id="2" name="Rubrik 1"/>
+          <p:cNvSpPr>
+            <a:spLocks noGrp="1"/>
+          </p:cNvSpPr>
+          <p:nvPr>
+            <p:ph type="title"/>
+          </p:nvPr>
+        </p:nvSpPr>
+        <p:spPr/>
+        <p:txBody>
+          <a:bodyPr/>
+          <a:lstStyle/>
+          <a:p>
+            <a:r>
+              <a:rPr lang="sv-SE" dirty="0" smtClean="0"/>
+              <a:t>Kommunikation</a:t>
+            </a:r>
+            <a:endParaRPr lang="sv-SE" dirty="0"/>
+          </a:p>
+        </p:txBody>
+      </p:sp>
+      <p:sp>
+        <p:nvSpPr>
+          <p:cNvPr id="3" name="Platshållare för innehåll 2"/>
+          <p:cNvSpPr>
+            <a:spLocks noGrp="1"/>
+          </p:cNvSpPr>
+          <p:nvPr>
+            <p:ph idx="1"/>
+          </p:nvPr>
+        </p:nvSpPr>
+        <p:spPr/>
+        <p:txBody>
+          <a:bodyPr/>
+          <a:lstStyle/>
+          <a:p>
+            <a:r>
+              <a:rPr lang="sv-SE" dirty="0" smtClean="0"/>
+              <a:t>Kommersiell produkt</a:t>
+            </a:r>
+          </a:p>
+          <a:p>
+            <a:pPr>
+              <a:buNone/>
+            </a:pPr>
+            <a:r>
+              <a:rPr lang="sv-SE" dirty="0" smtClean="0"/>
+              <a:t>Säljare 	</a:t>
+            </a:r>
+            <a:r>
+              <a:rPr lang="sv-SE" dirty="0" smtClean="0">
+                <a:sym typeface="Wingdings" pitchFamily="2" charset="2"/>
+              </a:rPr>
+              <a:t></a:t>
+            </a:r>
+            <a:r>
+              <a:rPr lang="sv-SE" dirty="0" smtClean="0"/>
+              <a:t> 	Inköpare </a:t>
+            </a:r>
+          </a:p>
+          <a:p>
+            <a:pPr>
+              <a:buNone/>
+            </a:pPr>
             <a:endParaRPr lang="sv-SE" dirty="0" smtClean="0"/>
           </a:p>
           <a:p>
+            <a:endParaRPr lang="sv-SE" dirty="0"/>
+          </a:p>
+        </p:txBody>
+      </p:sp>
+    </p:spTree>
+  </p:cSld>
+  <p:clrMapOvr>
+    <a:masterClrMapping/>
+  </p:clrMapOvr>
+</p:sld>
+</file>
+
+<file path=ppt/slides/slide36.xml><?xml version="1.0" encoding="utf-8"?>
+<p:sld xmlns:a="http://schemas.openxmlformats.org/drawingml/2006/main" xmlns:r="http://schemas.openxmlformats.org/officeDocument/2006/relationships" xmlns:p="http://schemas.openxmlformats.org/presentationml/2006/main">
+  <p:cSld>
+    <p:spTree>
+      <p:nvGrpSpPr>
+        <p:cNvPr id="1" name=""/>
+        <p:cNvGrpSpPr/>
+        <p:nvPr/>
+      </p:nvGrpSpPr>
+      <p:grpSpPr>
+        <a:xfrm>
+          <a:off x="0" y="0"/>
+          <a:ext cx="0" cy="0"/>
+          <a:chOff x="0" y="0"/>
+          <a:chExt cx="0" cy="0"/>
+        </a:xfrm>
+      </p:grpSpPr>
+      <p:sp>
+        <p:nvSpPr>
+          <p:cNvPr id="2" name="Rubrik 1"/>
+          <p:cNvSpPr>
+            <a:spLocks noGrp="1"/>
+          </p:cNvSpPr>
+          <p:nvPr>
+            <p:ph type="title"/>
+          </p:nvPr>
+        </p:nvSpPr>
+        <p:spPr/>
+        <p:txBody>
+          <a:bodyPr/>
+          <a:lstStyle/>
+          <a:p>
+            <a:r>
+              <a:rPr lang="sv-SE" dirty="0" smtClean="0"/>
+              <a:t>Kommunikation</a:t>
+            </a:r>
+            <a:endParaRPr lang="sv-SE" dirty="0"/>
+          </a:p>
+        </p:txBody>
+      </p:sp>
+      <p:sp>
+        <p:nvSpPr>
+          <p:cNvPr id="3" name="Platshållare för innehåll 2"/>
+          <p:cNvSpPr>
+            <a:spLocks noGrp="1"/>
+          </p:cNvSpPr>
+          <p:nvPr>
+            <p:ph idx="1"/>
+          </p:nvPr>
+        </p:nvSpPr>
+        <p:spPr/>
+        <p:txBody>
+          <a:bodyPr/>
+          <a:lstStyle/>
+          <a:p>
+            <a:r>
+              <a:rPr lang="sv-SE" dirty="0" smtClean="0"/>
+              <a:t>Kommersiell produkt</a:t>
+            </a:r>
+          </a:p>
+          <a:p>
+            <a:pPr>
+              <a:buNone/>
+            </a:pPr>
+            <a:r>
+              <a:rPr lang="sv-SE" dirty="0" smtClean="0"/>
+              <a:t>Säljare 	</a:t>
+            </a:r>
+            <a:r>
+              <a:rPr lang="sv-SE" dirty="0" smtClean="0">
+                <a:sym typeface="Wingdings" pitchFamily="2" charset="2"/>
+              </a:rPr>
+              <a:t></a:t>
+            </a:r>
+            <a:r>
+              <a:rPr lang="sv-SE" dirty="0" smtClean="0"/>
+              <a:t> 	Inköpare </a:t>
+            </a:r>
+          </a:p>
+          <a:p>
+            <a:pPr>
+              <a:buNone/>
+            </a:pPr>
+            <a:endParaRPr lang="sv-SE" dirty="0" smtClean="0"/>
+          </a:p>
+          <a:p>
+            <a:r>
+              <a:rPr lang="sv-SE" dirty="0" smtClean="0"/>
+              <a:t>Open </a:t>
+            </a:r>
             <a:r>
               <a:rPr lang="sv-SE" dirty="0" err="1" smtClean="0"/>
-              <a:t>MySQL</a:t>
+              <a:t>source-produkt</a:t>
             </a:r>
             <a:endParaRPr lang="sv-SE" dirty="0" smtClean="0"/>
           </a:p>
           <a:p>
-            <a:r>
-              <a:rPr lang="sv-SE" dirty="0" err="1" smtClean="0"/>
-              <a:t>SugarCRM</a:t>
+            <a:pPr>
+              <a:buNone/>
+            </a:pPr>
+            <a:r>
+              <a:rPr lang="sv-SE" dirty="0" smtClean="0"/>
+              <a:t>Utvecklare 	</a:t>
+            </a:r>
+            <a:r>
+              <a:rPr lang="sv-SE" dirty="0" smtClean="0">
+                <a:sym typeface="Wingdings" pitchFamily="2" charset="2"/>
+              </a:rPr>
+              <a:t> 	Utvecklare</a:t>
+            </a:r>
+            <a:endParaRPr lang="sv-SE" dirty="0" smtClean="0"/>
+          </a:p>
+          <a:p>
+            <a:endParaRPr lang="sv-SE" dirty="0"/>
+          </a:p>
+        </p:txBody>
+      </p:sp>
+    </p:spTree>
+  </p:cSld>
+  <p:clrMapOvr>
+    <a:masterClrMapping/>
+  </p:clrMapOvr>
+</p:sld>
+</file>
+
+<file path=ppt/slides/slide37.xml><?xml version="1.0" encoding="utf-8"?>
+<p:sld xmlns:a="http://schemas.openxmlformats.org/drawingml/2006/main" xmlns:r="http://schemas.openxmlformats.org/officeDocument/2006/relationships" xmlns:p="http://schemas.openxmlformats.org/presentationml/2006/main">
+  <p:cSld>
+    <p:spTree>
+      <p:nvGrpSpPr>
+        <p:cNvPr id="1" name=""/>
+        <p:cNvGrpSpPr/>
+        <p:nvPr/>
+      </p:nvGrpSpPr>
+      <p:grpSpPr>
+        <a:xfrm>
+          <a:off x="0" y="0"/>
+          <a:ext cx="0" cy="0"/>
+          <a:chOff x="0" y="0"/>
+          <a:chExt cx="0" cy="0"/>
+        </a:xfrm>
+      </p:grpSpPr>
+      <p:sp>
+        <p:nvSpPr>
+          <p:cNvPr id="2" name="Rubrik 1"/>
+          <p:cNvSpPr>
+            <a:spLocks noGrp="1"/>
+          </p:cNvSpPr>
+          <p:nvPr>
+            <p:ph type="title"/>
+          </p:nvPr>
+        </p:nvSpPr>
+        <p:spPr/>
+        <p:txBody>
+          <a:bodyPr/>
+          <a:lstStyle/>
+          <a:p>
+            <a:r>
+              <a:rPr lang="sv-SE" dirty="0" smtClean="0"/>
+              <a:t>Är det inte svårt med support?</a:t>
+            </a:r>
+            <a:endParaRPr lang="sv-SE" dirty="0"/>
+          </a:p>
+        </p:txBody>
+      </p:sp>
+      <p:sp>
+        <p:nvSpPr>
+          <p:cNvPr id="3" name="Platshållare för innehåll 2"/>
+          <p:cNvSpPr>
+            <a:spLocks noGrp="1"/>
+          </p:cNvSpPr>
+          <p:nvPr>
+            <p:ph idx="1"/>
+          </p:nvPr>
+        </p:nvSpPr>
+        <p:spPr/>
+        <p:txBody>
+          <a:bodyPr/>
+          <a:lstStyle/>
+          <a:p>
+            <a:endParaRPr lang="sv-SE" dirty="0"/>
+          </a:p>
+        </p:txBody>
+      </p:sp>
+    </p:spTree>
+  </p:cSld>
+  <p:clrMapOvr>
+    <a:masterClrMapping/>
+  </p:clrMapOvr>
+</p:sld>
+</file>
+
+<file path=ppt/slides/slide38.xml><?xml version="1.0" encoding="utf-8"?>
+<p:sld xmlns:a="http://schemas.openxmlformats.org/drawingml/2006/main" xmlns:r="http://schemas.openxmlformats.org/officeDocument/2006/relationships" xmlns:p="http://schemas.openxmlformats.org/presentationml/2006/main">
+  <p:cSld>
+    <p:spTree>
+      <p:nvGrpSpPr>
+        <p:cNvPr id="1" name=""/>
+        <p:cNvGrpSpPr/>
+        <p:nvPr/>
+      </p:nvGrpSpPr>
+      <p:grpSpPr>
+        <a:xfrm>
+          <a:off x="0" y="0"/>
+          <a:ext cx="0" cy="0"/>
+          <a:chOff x="0" y="0"/>
+          <a:chExt cx="0" cy="0"/>
+        </a:xfrm>
+      </p:grpSpPr>
+      <p:sp>
+        <p:nvSpPr>
+          <p:cNvPr id="2" name="Rubrik 1"/>
+          <p:cNvSpPr>
+            <a:spLocks noGrp="1"/>
+          </p:cNvSpPr>
+          <p:nvPr>
+            <p:ph type="title"/>
+          </p:nvPr>
+        </p:nvSpPr>
+        <p:spPr/>
+        <p:txBody>
+          <a:bodyPr/>
+          <a:lstStyle/>
+          <a:p>
+            <a:r>
+              <a:rPr lang="sv-SE" dirty="0" smtClean="0"/>
+              <a:t>Är det inte svårt med support?</a:t>
+            </a:r>
+            <a:endParaRPr lang="sv-SE" dirty="0"/>
+          </a:p>
+        </p:txBody>
+      </p:sp>
+      <p:sp>
+        <p:nvSpPr>
+          <p:cNvPr id="3" name="Platshållare för innehåll 2"/>
+          <p:cNvSpPr>
+            <a:spLocks noGrp="1"/>
+          </p:cNvSpPr>
+          <p:nvPr>
+            <p:ph idx="1"/>
+          </p:nvPr>
+        </p:nvSpPr>
+        <p:spPr/>
+        <p:txBody>
+          <a:bodyPr/>
+          <a:lstStyle/>
+          <a:p>
+            <a:r>
+              <a:rPr lang="sv-SE" dirty="0" smtClean="0"/>
+              <a:t>Support från utvecklarna av produkten</a:t>
+            </a:r>
+          </a:p>
+        </p:txBody>
+      </p:sp>
+    </p:spTree>
+  </p:cSld>
+  <p:clrMapOvr>
+    <a:masterClrMapping/>
+  </p:clrMapOvr>
+</p:sld>
+</file>
+
+<file path=ppt/slides/slide39.xml><?xml version="1.0" encoding="utf-8"?>
+<p:sld xmlns:a="http://schemas.openxmlformats.org/drawingml/2006/main" xmlns:r="http://schemas.openxmlformats.org/officeDocument/2006/relationships" xmlns:p="http://schemas.openxmlformats.org/presentationml/2006/main">
+  <p:cSld>
+    <p:spTree>
+      <p:nvGrpSpPr>
+        <p:cNvPr id="1" name=""/>
+        <p:cNvGrpSpPr/>
+        <p:nvPr/>
+      </p:nvGrpSpPr>
+      <p:grpSpPr>
+        <a:xfrm>
+          <a:off x="0" y="0"/>
+          <a:ext cx="0" cy="0"/>
+          <a:chOff x="0" y="0"/>
+          <a:chExt cx="0" cy="0"/>
+        </a:xfrm>
+      </p:grpSpPr>
+      <p:sp>
+        <p:nvSpPr>
+          <p:cNvPr id="2" name="Rubrik 1"/>
+          <p:cNvSpPr>
+            <a:spLocks noGrp="1"/>
+          </p:cNvSpPr>
+          <p:nvPr>
+            <p:ph type="title"/>
+          </p:nvPr>
+        </p:nvSpPr>
+        <p:spPr/>
+        <p:txBody>
+          <a:bodyPr/>
+          <a:lstStyle/>
+          <a:p>
+            <a:r>
+              <a:rPr lang="sv-SE" dirty="0" smtClean="0"/>
+              <a:t>Är det inte svårt med support?</a:t>
+            </a:r>
+            <a:endParaRPr lang="sv-SE" dirty="0"/>
+          </a:p>
+        </p:txBody>
+      </p:sp>
+      <p:sp>
+        <p:nvSpPr>
+          <p:cNvPr id="3" name="Platshållare för innehåll 2"/>
+          <p:cNvSpPr>
+            <a:spLocks noGrp="1"/>
+          </p:cNvSpPr>
+          <p:nvPr>
+            <p:ph idx="1"/>
+          </p:nvPr>
+        </p:nvSpPr>
+        <p:spPr/>
+        <p:txBody>
+          <a:bodyPr/>
+          <a:lstStyle/>
+          <a:p>
+            <a:r>
+              <a:rPr lang="sv-SE" dirty="0" smtClean="0"/>
+              <a:t>Support från utvecklarna av produkten</a:t>
+            </a:r>
+          </a:p>
+          <a:p>
+            <a:r>
+              <a:rPr lang="sv-SE" dirty="0" smtClean="0"/>
+              <a:t>Support från 3:e part</a:t>
             </a:r>
             <a:endParaRPr lang="sv-SE" dirty="0"/>
           </a:p>
@@ -4827,19 +7162,14 @@
             <p:ph type="title"/>
           </p:nvPr>
         </p:nvSpPr>
-        <p:spPr>
-          <a:xfrm>
-            <a:off x="481013" y="349250"/>
-            <a:ext cx="7543800" cy="1518739"/>
-          </a:xfrm>
-        </p:spPr>
-        <p:txBody>
-          <a:bodyPr/>
-          <a:lstStyle/>
-          <a:p>
-            <a:r>
-              <a:rPr lang="sv-SE" dirty="0" smtClean="0"/>
-              <a:t>Vanliga prioriteringar inom kommersiella programvaror</a:t>
+        <p:spPr/>
+        <p:txBody>
+          <a:bodyPr/>
+          <a:lstStyle/>
+          <a:p>
+            <a:r>
+              <a:rPr lang="sv-SE" dirty="0" smtClean="0"/>
+              <a:t>Exempel</a:t>
             </a:r>
             <a:endParaRPr lang="sv-SE" dirty="0"/>
           </a:p>
@@ -4855,25 +7185,615 @@
             <p:ph idx="1"/>
           </p:nvPr>
         </p:nvSpPr>
-        <p:spPr>
-          <a:xfrm>
-            <a:off x="469900" y="1841862"/>
-            <a:ext cx="8229600" cy="4177937"/>
-          </a:xfrm>
-        </p:spPr>
-        <p:txBody>
-          <a:bodyPr/>
-          <a:lstStyle/>
-          <a:p>
-            <a:r>
-              <a:rPr lang="sv-SE" dirty="0" smtClean="0"/>
-              <a:t>Time to market</a:t>
-            </a:r>
-          </a:p>
-          <a:p>
-            <a:r>
-              <a:rPr lang="sv-SE" dirty="0" smtClean="0"/>
-              <a:t>Visuella features</a:t>
+        <p:spPr/>
+        <p:txBody>
+          <a:bodyPr/>
+          <a:lstStyle/>
+          <a:p>
+            <a:r>
+              <a:rPr lang="sv-SE" dirty="0" smtClean="0"/>
+              <a:t>Apache (Webbserver)</a:t>
+            </a:r>
+          </a:p>
+          <a:p>
+            <a:endParaRPr lang="sv-SE" dirty="0"/>
+          </a:p>
+        </p:txBody>
+      </p:sp>
+    </p:spTree>
+  </p:cSld>
+  <p:clrMapOvr>
+    <a:masterClrMapping/>
+  </p:clrMapOvr>
+  <p:timing>
+    <p:tnLst>
+      <p:par>
+        <p:cTn id="1" dur="indefinite" restart="never" nodeType="tmRoot"/>
+      </p:par>
+    </p:tnLst>
+  </p:timing>
+</p:sld>
+</file>
+
+<file path=ppt/slides/slide40.xml><?xml version="1.0" encoding="utf-8"?>
+<p:sld xmlns:a="http://schemas.openxmlformats.org/drawingml/2006/main" xmlns:r="http://schemas.openxmlformats.org/officeDocument/2006/relationships" xmlns:p="http://schemas.openxmlformats.org/presentationml/2006/main">
+  <p:cSld>
+    <p:spTree>
+      <p:nvGrpSpPr>
+        <p:cNvPr id="1" name=""/>
+        <p:cNvGrpSpPr/>
+        <p:nvPr/>
+      </p:nvGrpSpPr>
+      <p:grpSpPr>
+        <a:xfrm>
+          <a:off x="0" y="0"/>
+          <a:ext cx="0" cy="0"/>
+          <a:chOff x="0" y="0"/>
+          <a:chExt cx="0" cy="0"/>
+        </a:xfrm>
+      </p:grpSpPr>
+      <p:sp>
+        <p:nvSpPr>
+          <p:cNvPr id="2" name="Rubrik 1"/>
+          <p:cNvSpPr>
+            <a:spLocks noGrp="1"/>
+          </p:cNvSpPr>
+          <p:nvPr>
+            <p:ph type="title"/>
+          </p:nvPr>
+        </p:nvSpPr>
+        <p:spPr/>
+        <p:txBody>
+          <a:bodyPr/>
+          <a:lstStyle/>
+          <a:p>
+            <a:r>
+              <a:rPr lang="sv-SE" dirty="0" smtClean="0"/>
+              <a:t>Det finns ju ingen ansvarig?</a:t>
+            </a:r>
+            <a:endParaRPr lang="sv-SE" dirty="0"/>
+          </a:p>
+        </p:txBody>
+      </p:sp>
+      <p:sp>
+        <p:nvSpPr>
+          <p:cNvPr id="3" name="Platshållare för innehåll 2"/>
+          <p:cNvSpPr>
+            <a:spLocks noGrp="1"/>
+          </p:cNvSpPr>
+          <p:nvPr>
+            <p:ph idx="1"/>
+          </p:nvPr>
+        </p:nvSpPr>
+        <p:spPr/>
+        <p:txBody>
+          <a:bodyPr/>
+          <a:lstStyle/>
+          <a:p>
+            <a:endParaRPr lang="sv-SE" sz="2800" dirty="0" smtClean="0"/>
+          </a:p>
+        </p:txBody>
+      </p:sp>
+    </p:spTree>
+  </p:cSld>
+  <p:clrMapOvr>
+    <a:masterClrMapping/>
+  </p:clrMapOvr>
+</p:sld>
+</file>
+
+<file path=ppt/slides/slide41.xml><?xml version="1.0" encoding="utf-8"?>
+<p:sld xmlns:a="http://schemas.openxmlformats.org/drawingml/2006/main" xmlns:r="http://schemas.openxmlformats.org/officeDocument/2006/relationships" xmlns:p="http://schemas.openxmlformats.org/presentationml/2006/main">
+  <p:cSld>
+    <p:spTree>
+      <p:nvGrpSpPr>
+        <p:cNvPr id="1" name=""/>
+        <p:cNvGrpSpPr/>
+        <p:nvPr/>
+      </p:nvGrpSpPr>
+      <p:grpSpPr>
+        <a:xfrm>
+          <a:off x="0" y="0"/>
+          <a:ext cx="0" cy="0"/>
+          <a:chOff x="0" y="0"/>
+          <a:chExt cx="0" cy="0"/>
+        </a:xfrm>
+      </p:grpSpPr>
+      <p:sp>
+        <p:nvSpPr>
+          <p:cNvPr id="2" name="Rubrik 1"/>
+          <p:cNvSpPr>
+            <a:spLocks noGrp="1"/>
+          </p:cNvSpPr>
+          <p:nvPr>
+            <p:ph type="title"/>
+          </p:nvPr>
+        </p:nvSpPr>
+        <p:spPr/>
+        <p:txBody>
+          <a:bodyPr/>
+          <a:lstStyle/>
+          <a:p>
+            <a:r>
+              <a:rPr lang="sv-SE" dirty="0" smtClean="0"/>
+              <a:t>Det finns ju ingen ansvarig?</a:t>
+            </a:r>
+            <a:endParaRPr lang="sv-SE" dirty="0"/>
+          </a:p>
+        </p:txBody>
+      </p:sp>
+      <p:sp>
+        <p:nvSpPr>
+          <p:cNvPr id="3" name="Platshållare för innehåll 2"/>
+          <p:cNvSpPr>
+            <a:spLocks noGrp="1"/>
+          </p:cNvSpPr>
+          <p:nvPr>
+            <p:ph idx="1"/>
+          </p:nvPr>
+        </p:nvSpPr>
+        <p:spPr/>
+        <p:txBody>
+          <a:bodyPr/>
+          <a:lstStyle/>
+          <a:p>
+            <a:r>
+              <a:rPr lang="sv-SE" sz="2800" dirty="0" smtClean="0"/>
+              <a:t>Vem ska jag stämma?</a:t>
+            </a:r>
+          </a:p>
+        </p:txBody>
+      </p:sp>
+    </p:spTree>
+  </p:cSld>
+  <p:clrMapOvr>
+    <a:masterClrMapping/>
+  </p:clrMapOvr>
+</p:sld>
+</file>
+
+<file path=ppt/slides/slide42.xml><?xml version="1.0" encoding="utf-8"?>
+<p:sld xmlns:a="http://schemas.openxmlformats.org/drawingml/2006/main" xmlns:r="http://schemas.openxmlformats.org/officeDocument/2006/relationships" xmlns:p="http://schemas.openxmlformats.org/presentationml/2006/main">
+  <p:cSld>
+    <p:spTree>
+      <p:nvGrpSpPr>
+        <p:cNvPr id="1" name=""/>
+        <p:cNvGrpSpPr/>
+        <p:nvPr/>
+      </p:nvGrpSpPr>
+      <p:grpSpPr>
+        <a:xfrm>
+          <a:off x="0" y="0"/>
+          <a:ext cx="0" cy="0"/>
+          <a:chOff x="0" y="0"/>
+          <a:chExt cx="0" cy="0"/>
+        </a:xfrm>
+      </p:grpSpPr>
+      <p:sp>
+        <p:nvSpPr>
+          <p:cNvPr id="2" name="Rubrik 1"/>
+          <p:cNvSpPr>
+            <a:spLocks noGrp="1"/>
+          </p:cNvSpPr>
+          <p:nvPr>
+            <p:ph type="title"/>
+          </p:nvPr>
+        </p:nvSpPr>
+        <p:spPr/>
+        <p:txBody>
+          <a:bodyPr/>
+          <a:lstStyle/>
+          <a:p>
+            <a:r>
+              <a:rPr lang="sv-SE" dirty="0" smtClean="0"/>
+              <a:t>Det finns ju ingen ansvarig?</a:t>
+            </a:r>
+            <a:endParaRPr lang="sv-SE" dirty="0"/>
+          </a:p>
+        </p:txBody>
+      </p:sp>
+      <p:sp>
+        <p:nvSpPr>
+          <p:cNvPr id="3" name="Platshållare för innehåll 2"/>
+          <p:cNvSpPr>
+            <a:spLocks noGrp="1"/>
+          </p:cNvSpPr>
+          <p:nvPr>
+            <p:ph idx="1"/>
+          </p:nvPr>
+        </p:nvSpPr>
+        <p:spPr/>
+        <p:txBody>
+          <a:bodyPr/>
+          <a:lstStyle/>
+          <a:p>
+            <a:r>
+              <a:rPr lang="sv-SE" sz="2800" dirty="0" smtClean="0"/>
+              <a:t>Vem ska jag stämma?</a:t>
+            </a:r>
+          </a:p>
+          <a:p>
+            <a:r>
+              <a:rPr lang="sv-SE" sz="2800" dirty="0" smtClean="0"/>
+              <a:t>De flesta kommersiella produkter kräver godkännande av en ”Legal </a:t>
+            </a:r>
+            <a:r>
+              <a:rPr lang="sv-SE" sz="2800" dirty="0" err="1" smtClean="0"/>
+              <a:t>disclaimer</a:t>
+            </a:r>
+            <a:r>
+              <a:rPr lang="sv-SE" sz="2800" dirty="0" smtClean="0"/>
+              <a:t>”</a:t>
+            </a:r>
+          </a:p>
+        </p:txBody>
+      </p:sp>
+    </p:spTree>
+  </p:cSld>
+  <p:clrMapOvr>
+    <a:masterClrMapping/>
+  </p:clrMapOvr>
+</p:sld>
+</file>
+
+<file path=ppt/slides/slide43.xml><?xml version="1.0" encoding="utf-8"?>
+<p:sld xmlns:a="http://schemas.openxmlformats.org/drawingml/2006/main" xmlns:r="http://schemas.openxmlformats.org/officeDocument/2006/relationships" xmlns:p="http://schemas.openxmlformats.org/presentationml/2006/main">
+  <p:cSld>
+    <p:spTree>
+      <p:nvGrpSpPr>
+        <p:cNvPr id="1" name=""/>
+        <p:cNvGrpSpPr/>
+        <p:nvPr/>
+      </p:nvGrpSpPr>
+      <p:grpSpPr>
+        <a:xfrm>
+          <a:off x="0" y="0"/>
+          <a:ext cx="0" cy="0"/>
+          <a:chOff x="0" y="0"/>
+          <a:chExt cx="0" cy="0"/>
+        </a:xfrm>
+      </p:grpSpPr>
+      <p:sp>
+        <p:nvSpPr>
+          <p:cNvPr id="2" name="Rubrik 1"/>
+          <p:cNvSpPr>
+            <a:spLocks noGrp="1"/>
+          </p:cNvSpPr>
+          <p:nvPr>
+            <p:ph type="title"/>
+          </p:nvPr>
+        </p:nvSpPr>
+        <p:spPr/>
+        <p:txBody>
+          <a:bodyPr/>
+          <a:lstStyle/>
+          <a:p>
+            <a:r>
+              <a:rPr lang="sv-SE" dirty="0" smtClean="0"/>
+              <a:t>Det finns ju ingen ansvarig?</a:t>
+            </a:r>
+            <a:endParaRPr lang="sv-SE" dirty="0"/>
+          </a:p>
+        </p:txBody>
+      </p:sp>
+      <p:sp>
+        <p:nvSpPr>
+          <p:cNvPr id="3" name="Platshållare för innehåll 2"/>
+          <p:cNvSpPr>
+            <a:spLocks noGrp="1"/>
+          </p:cNvSpPr>
+          <p:nvPr>
+            <p:ph idx="1"/>
+          </p:nvPr>
+        </p:nvSpPr>
+        <p:spPr/>
+        <p:txBody>
+          <a:bodyPr/>
+          <a:lstStyle/>
+          <a:p>
+            <a:r>
+              <a:rPr lang="sv-SE" sz="2800" dirty="0" smtClean="0"/>
+              <a:t>Vem ska jag stämma?</a:t>
+            </a:r>
+          </a:p>
+          <a:p>
+            <a:r>
+              <a:rPr lang="sv-SE" sz="2800" dirty="0" smtClean="0"/>
+              <a:t>De flesta kommersiella produkter kräver godkännande av en ”Legal </a:t>
+            </a:r>
+            <a:r>
+              <a:rPr lang="sv-SE" sz="2800" dirty="0" err="1" smtClean="0"/>
+              <a:t>disclaimer</a:t>
+            </a:r>
+            <a:r>
+              <a:rPr lang="sv-SE" sz="2800" dirty="0" smtClean="0"/>
+              <a:t>”</a:t>
+            </a:r>
+          </a:p>
+          <a:p>
+            <a:r>
+              <a:rPr lang="sv-SE" sz="2800" dirty="0" smtClean="0">
+                <a:hlinkClick r:id="rId2"/>
+              </a:rPr>
+              <a:t>http://www.adobe.com/misc/copyright.html</a:t>
+            </a:r>
+            <a:r>
+              <a:rPr lang="sv-SE" sz="2800" dirty="0" smtClean="0"/>
+              <a:t>: ”</a:t>
+            </a:r>
+            <a:r>
+              <a:rPr lang="en-US" sz="2800" dirty="0" smtClean="0"/>
+              <a:t>… USE OF ANY MATERIALS IS DONE AT YOUR OWN DISCRETION AND RISK AND WITH YOUR AGREEMENT THAT YOU WILL BE SOLELY RESPONSIBLE FOR ANY DAMAGE TO YOUR COMPUTER SYSTEM…</a:t>
+            </a:r>
+            <a:r>
+              <a:rPr lang="sv-SE" sz="2800" dirty="0" smtClean="0"/>
+              <a:t>”</a:t>
+            </a:r>
+          </a:p>
+        </p:txBody>
+      </p:sp>
+    </p:spTree>
+  </p:cSld>
+  <p:clrMapOvr>
+    <a:masterClrMapping/>
+  </p:clrMapOvr>
+</p:sld>
+</file>
+
+<file path=ppt/slides/slide44.xml><?xml version="1.0" encoding="utf-8"?>
+<p:sld xmlns:a="http://schemas.openxmlformats.org/drawingml/2006/main" xmlns:r="http://schemas.openxmlformats.org/officeDocument/2006/relationships" xmlns:p="http://schemas.openxmlformats.org/presentationml/2006/main">
+  <p:cSld>
+    <p:spTree>
+      <p:nvGrpSpPr>
+        <p:cNvPr id="1" name=""/>
+        <p:cNvGrpSpPr/>
+        <p:nvPr/>
+      </p:nvGrpSpPr>
+      <p:grpSpPr>
+        <a:xfrm>
+          <a:off x="0" y="0"/>
+          <a:ext cx="0" cy="0"/>
+          <a:chOff x="0" y="0"/>
+          <a:chExt cx="0" cy="0"/>
+        </a:xfrm>
+      </p:grpSpPr>
+      <p:sp>
+        <p:nvSpPr>
+          <p:cNvPr id="2" name="Rubrik 1"/>
+          <p:cNvSpPr>
+            <a:spLocks noGrp="1"/>
+          </p:cNvSpPr>
+          <p:nvPr>
+            <p:ph type="title"/>
+          </p:nvPr>
+        </p:nvSpPr>
+        <p:spPr/>
+        <p:txBody>
+          <a:bodyPr/>
+          <a:lstStyle/>
+          <a:p>
+            <a:r>
+              <a:rPr lang="sv-SE" dirty="0" err="1" smtClean="0"/>
+              <a:t>Sammafattning</a:t>
+            </a:r>
+            <a:endParaRPr lang="sv-SE" dirty="0"/>
+          </a:p>
+        </p:txBody>
+      </p:sp>
+      <p:sp>
+        <p:nvSpPr>
+          <p:cNvPr id="3" name="Platshållare för innehåll 2"/>
+          <p:cNvSpPr>
+            <a:spLocks noGrp="1"/>
+          </p:cNvSpPr>
+          <p:nvPr>
+            <p:ph idx="1"/>
+          </p:nvPr>
+        </p:nvSpPr>
+        <p:spPr/>
+        <p:txBody>
+          <a:bodyPr/>
+          <a:lstStyle/>
+          <a:p>
+            <a:endParaRPr lang="sv-SE" dirty="0"/>
+          </a:p>
+        </p:txBody>
+      </p:sp>
+    </p:spTree>
+  </p:cSld>
+  <p:clrMapOvr>
+    <a:masterClrMapping/>
+  </p:clrMapOvr>
+</p:sld>
+</file>
+
+<file path=ppt/slides/slide45.xml><?xml version="1.0" encoding="utf-8"?>
+<p:sld xmlns:a="http://schemas.openxmlformats.org/drawingml/2006/main" xmlns:r="http://schemas.openxmlformats.org/officeDocument/2006/relationships" xmlns:p="http://schemas.openxmlformats.org/presentationml/2006/main">
+  <p:cSld>
+    <p:spTree>
+      <p:nvGrpSpPr>
+        <p:cNvPr id="1" name=""/>
+        <p:cNvGrpSpPr/>
+        <p:nvPr/>
+      </p:nvGrpSpPr>
+      <p:grpSpPr>
+        <a:xfrm>
+          <a:off x="0" y="0"/>
+          <a:ext cx="0" cy="0"/>
+          <a:chOff x="0" y="0"/>
+          <a:chExt cx="0" cy="0"/>
+        </a:xfrm>
+      </p:grpSpPr>
+      <p:sp>
+        <p:nvSpPr>
+          <p:cNvPr id="2" name="Rubrik 1"/>
+          <p:cNvSpPr>
+            <a:spLocks noGrp="1"/>
+          </p:cNvSpPr>
+          <p:nvPr>
+            <p:ph type="title"/>
+          </p:nvPr>
+        </p:nvSpPr>
+        <p:spPr/>
+        <p:txBody>
+          <a:bodyPr/>
+          <a:lstStyle/>
+          <a:p>
+            <a:r>
+              <a:rPr lang="sv-SE" dirty="0" err="1" smtClean="0"/>
+              <a:t>Sammafattning</a:t>
+            </a:r>
+            <a:endParaRPr lang="sv-SE" dirty="0"/>
+          </a:p>
+        </p:txBody>
+      </p:sp>
+      <p:sp>
+        <p:nvSpPr>
+          <p:cNvPr id="3" name="Platshållare för innehåll 2"/>
+          <p:cNvSpPr>
+            <a:spLocks noGrp="1"/>
+          </p:cNvSpPr>
+          <p:nvPr>
+            <p:ph idx="1"/>
+          </p:nvPr>
+        </p:nvSpPr>
+        <p:spPr/>
+        <p:txBody>
+          <a:bodyPr/>
+          <a:lstStyle/>
+          <a:p>
+            <a:r>
+              <a:rPr lang="sv-SE" dirty="0" smtClean="0"/>
+              <a:t>Det är svårt att säga att Open </a:t>
+            </a:r>
+            <a:r>
+              <a:rPr lang="sv-SE" dirty="0" err="1" smtClean="0"/>
+              <a:t>source</a:t>
+            </a:r>
+            <a:r>
+              <a:rPr lang="sv-SE" dirty="0" smtClean="0"/>
+              <a:t> är </a:t>
+            </a:r>
+            <a:r>
+              <a:rPr lang="sv-SE" i="1" dirty="0" smtClean="0"/>
+              <a:t>bättre </a:t>
+            </a:r>
+            <a:r>
+              <a:rPr lang="sv-SE" dirty="0" smtClean="0"/>
+              <a:t>än </a:t>
+            </a:r>
+            <a:r>
+              <a:rPr lang="sv-SE" smtClean="0"/>
+              <a:t>kommersiella programvaror</a:t>
+            </a:r>
+            <a:endParaRPr lang="sv-SE" dirty="0" smtClean="0"/>
+          </a:p>
+        </p:txBody>
+      </p:sp>
+    </p:spTree>
+  </p:cSld>
+  <p:clrMapOvr>
+    <a:masterClrMapping/>
+  </p:clrMapOvr>
+</p:sld>
+</file>
+
+<file path=ppt/slides/slide46.xml><?xml version="1.0" encoding="utf-8"?>
+<p:sld xmlns:a="http://schemas.openxmlformats.org/drawingml/2006/main" xmlns:r="http://schemas.openxmlformats.org/officeDocument/2006/relationships" xmlns:p="http://schemas.openxmlformats.org/presentationml/2006/main">
+  <p:cSld>
+    <p:spTree>
+      <p:nvGrpSpPr>
+        <p:cNvPr id="1" name=""/>
+        <p:cNvGrpSpPr/>
+        <p:nvPr/>
+      </p:nvGrpSpPr>
+      <p:grpSpPr>
+        <a:xfrm>
+          <a:off x="0" y="0"/>
+          <a:ext cx="0" cy="0"/>
+          <a:chOff x="0" y="0"/>
+          <a:chExt cx="0" cy="0"/>
+        </a:xfrm>
+      </p:grpSpPr>
+      <p:sp>
+        <p:nvSpPr>
+          <p:cNvPr id="2" name="Rubrik 1"/>
+          <p:cNvSpPr>
+            <a:spLocks noGrp="1"/>
+          </p:cNvSpPr>
+          <p:nvPr>
+            <p:ph type="title"/>
+          </p:nvPr>
+        </p:nvSpPr>
+        <p:spPr/>
+        <p:txBody>
+          <a:bodyPr/>
+          <a:lstStyle/>
+          <a:p>
+            <a:r>
+              <a:rPr lang="sv-SE" dirty="0" err="1" smtClean="0"/>
+              <a:t>Sammafattning</a:t>
+            </a:r>
+            <a:endParaRPr lang="sv-SE" dirty="0"/>
+          </a:p>
+        </p:txBody>
+      </p:sp>
+      <p:sp>
+        <p:nvSpPr>
+          <p:cNvPr id="3" name="Platshållare för innehåll 2"/>
+          <p:cNvSpPr>
+            <a:spLocks noGrp="1"/>
+          </p:cNvSpPr>
+          <p:nvPr>
+            <p:ph idx="1"/>
+          </p:nvPr>
+        </p:nvSpPr>
+        <p:spPr/>
+        <p:txBody>
+          <a:bodyPr/>
+          <a:lstStyle/>
+          <a:p>
+            <a:r>
+              <a:rPr lang="sv-SE" dirty="0" smtClean="0"/>
+              <a:t>Det är svårt att säga att Open </a:t>
+            </a:r>
+            <a:r>
+              <a:rPr lang="sv-SE" dirty="0" err="1" smtClean="0"/>
+              <a:t>source</a:t>
+            </a:r>
+            <a:r>
+              <a:rPr lang="sv-SE" dirty="0" smtClean="0"/>
+              <a:t> är </a:t>
+            </a:r>
+            <a:r>
+              <a:rPr lang="sv-SE" i="1" dirty="0" smtClean="0"/>
+              <a:t>bättre </a:t>
+            </a:r>
+            <a:r>
+              <a:rPr lang="sv-SE" dirty="0" smtClean="0"/>
+              <a:t>än kommersiella programvaror</a:t>
+            </a:r>
+          </a:p>
+          <a:p>
+            <a:r>
+              <a:rPr lang="sv-SE" dirty="0" smtClean="0"/>
+              <a:t>Bäst är att utvärdera från fall till fall (Fast jag kommer nog oftast välja </a:t>
+            </a:r>
+            <a:r>
+              <a:rPr lang="sv-SE" dirty="0" err="1" smtClean="0"/>
+              <a:t>open</a:t>
+            </a:r>
+            <a:r>
+              <a:rPr lang="sv-SE" dirty="0" smtClean="0"/>
+              <a:t> </a:t>
+            </a:r>
+            <a:r>
+              <a:rPr lang="sv-SE" dirty="0" err="1" smtClean="0"/>
+              <a:t>sourcelösningar</a:t>
+            </a:r>
+            <a:r>
+              <a:rPr lang="sv-SE" dirty="0" smtClean="0"/>
+              <a:t>)</a:t>
             </a:r>
             <a:endParaRPr lang="sv-SE" dirty="0"/>
           </a:p>
@@ -4914,19 +7834,14 @@
             <p:ph type="title"/>
           </p:nvPr>
         </p:nvSpPr>
-        <p:spPr>
-          <a:xfrm>
-            <a:off x="481013" y="349250"/>
-            <a:ext cx="7543800" cy="1518739"/>
-          </a:xfrm>
-        </p:spPr>
-        <p:txBody>
-          <a:bodyPr/>
-          <a:lstStyle/>
-          <a:p>
-            <a:r>
-              <a:rPr lang="sv-SE" dirty="0" smtClean="0"/>
-              <a:t>Vanliga prioritering inom öppen källkod</a:t>
+        <p:spPr/>
+        <p:txBody>
+          <a:bodyPr/>
+          <a:lstStyle/>
+          <a:p>
+            <a:r>
+              <a:rPr lang="sv-SE" dirty="0" smtClean="0"/>
+              <a:t>Exempel</a:t>
             </a:r>
             <a:endParaRPr lang="sv-SE" dirty="0"/>
           </a:p>
@@ -4942,43 +7857,23 @@
             <p:ph idx="1"/>
           </p:nvPr>
         </p:nvSpPr>
-        <p:spPr>
-          <a:xfrm>
-            <a:off x="469900" y="2377440"/>
-            <a:ext cx="8229600" cy="3642360"/>
-          </a:xfrm>
-        </p:spPr>
-        <p:txBody>
-          <a:bodyPr/>
-          <a:lstStyle/>
-          <a:p>
-            <a:r>
-              <a:rPr lang="sv-SE" dirty="0" smtClean="0"/>
-              <a:t>Kvalitet framför features</a:t>
-            </a:r>
-          </a:p>
-          <a:p>
-            <a:r>
-              <a:rPr lang="sv-SE" dirty="0" smtClean="0"/>
-              <a:t>Ren </a:t>
-            </a:r>
-            <a:r>
-              <a:rPr lang="sv-SE" dirty="0" smtClean="0"/>
-              <a:t>teknisk design</a:t>
-            </a:r>
-            <a:endParaRPr lang="sv-SE" dirty="0" smtClean="0"/>
-          </a:p>
-          <a:p>
-            <a:r>
-              <a:rPr lang="sv-SE" dirty="0" smtClean="0"/>
-              <a:t>Stabilitet</a:t>
-            </a:r>
-          </a:p>
-          <a:p>
-            <a:r>
-              <a:rPr lang="sv-SE" dirty="0" smtClean="0"/>
-              <a:t>Följa standarder</a:t>
-            </a:r>
+        <p:spPr/>
+        <p:txBody>
+          <a:bodyPr/>
+          <a:lstStyle/>
+          <a:p>
+            <a:r>
+              <a:rPr lang="sv-SE" dirty="0" smtClean="0"/>
+              <a:t>Apache (Webbserver)</a:t>
+            </a:r>
+          </a:p>
+          <a:p>
+            <a:r>
+              <a:rPr lang="sv-SE" dirty="0" smtClean="0"/>
+              <a:t>Linux (Operativsystem)</a:t>
+            </a:r>
+          </a:p>
+          <a:p>
             <a:endParaRPr lang="sv-SE" dirty="0"/>
           </a:p>
         </p:txBody>
@@ -4988,6 +7883,13 @@
   <p:clrMapOvr>
     <a:masterClrMapping/>
   </p:clrMapOvr>
+  <p:timing>
+    <p:tnLst>
+      <p:par>
+        <p:cTn id="1" dur="indefinite" restart="never" nodeType="tmRoot"/>
+      </p:par>
+    </p:tnLst>
+  </p:timing>
 </p:sld>
 </file>
 
@@ -5025,7 +7927,7 @@
           <a:p>
             <a:r>
               <a:rPr lang="sv-SE" dirty="0" smtClean="0"/>
-              <a:t>Fördelar</a:t>
+              <a:t>Exempel</a:t>
             </a:r>
             <a:endParaRPr lang="sv-SE" dirty="0"/>
           </a:p>
@@ -5048,36 +7950,26 @@
           <a:p>
             <a:r>
               <a:rPr lang="sv-SE" dirty="0" smtClean="0"/>
-              <a:t>Högre säkerhet (</a:t>
-            </a:r>
+              <a:t>Apache (Webbserver)</a:t>
+            </a:r>
+          </a:p>
+          <a:p>
+            <a:r>
+              <a:rPr lang="sv-SE" dirty="0" smtClean="0"/>
+              <a:t>Linux (Operativsystem)</a:t>
+            </a:r>
+          </a:p>
+          <a:p>
             <a:r>
               <a:rPr lang="sv-SE" dirty="0" err="1" smtClean="0"/>
-              <a:t>Jmfr</a:t>
-            </a:r>
-            <a:r>
-              <a:rPr lang="sv-SE" dirty="0" smtClean="0"/>
-              <a:t> Borland </a:t>
-            </a:r>
-            <a:r>
-              <a:rPr lang="sv-SE" dirty="0" err="1" smtClean="0"/>
-              <a:t>Inprise</a:t>
-            </a:r>
-            <a:r>
-              <a:rPr lang="sv-SE" dirty="0" smtClean="0"/>
-              <a:t>)</a:t>
-            </a:r>
-          </a:p>
-          <a:p>
-            <a:r>
-              <a:rPr lang="sv-SE" dirty="0" smtClean="0"/>
-              <a:t>Standarder ger större flexibilitet</a:t>
-            </a:r>
-          </a:p>
-          <a:p>
-            <a:r>
-              <a:rPr lang="sv-SE" dirty="0" smtClean="0"/>
-              <a:t>Ren design gör det lättare att läsa, förstå och bygga vidare på</a:t>
-            </a:r>
+              <a:t>MySQL</a:t>
+            </a:r>
+            <a:r>
+              <a:rPr lang="sv-SE" dirty="0" smtClean="0"/>
+              <a:t> (Databas)</a:t>
+            </a:r>
+          </a:p>
+          <a:p>
             <a:endParaRPr lang="sv-SE" dirty="0"/>
           </a:p>
         </p:txBody>
@@ -5087,6 +7979,13 @@
   <p:clrMapOvr>
     <a:masterClrMapping/>
   </p:clrMapOvr>
+  <p:timing>
+    <p:tnLst>
+      <p:par>
+        <p:cTn id="1" dur="indefinite" restart="never" nodeType="tmRoot"/>
+      </p:par>
+    </p:tnLst>
+  </p:timing>
 </p:sld>
 </file>
 
@@ -5124,7 +8023,7 @@
           <a:p>
             <a:r>
               <a:rPr lang="sv-SE" dirty="0" smtClean="0"/>
-              <a:t>Fördelar för verksamheten</a:t>
+              <a:t>Exempel</a:t>
             </a:r>
             <a:endParaRPr lang="sv-SE" dirty="0"/>
           </a:p>
@@ -5147,23 +8046,33 @@
           <a:p>
             <a:r>
               <a:rPr lang="sv-SE" dirty="0" smtClean="0"/>
-              <a:t>Gratis </a:t>
-            </a:r>
-            <a:r>
-              <a:rPr lang="sv-SE" dirty="0" smtClean="0"/>
-              <a:t>inköp (Påverkar total </a:t>
-            </a:r>
+              <a:t>Apache (Webbserver)</a:t>
+            </a:r>
+          </a:p>
+          <a:p>
+            <a:r>
+              <a:rPr lang="sv-SE" dirty="0" smtClean="0"/>
+              <a:t>Linux (Operativsystem)</a:t>
+            </a:r>
+          </a:p>
+          <a:p>
             <a:r>
               <a:rPr lang="sv-SE" dirty="0" err="1" smtClean="0"/>
-              <a:t>cost</a:t>
-            </a:r>
-            <a:r>
-              <a:rPr lang="sv-SE" dirty="0" smtClean="0"/>
-              <a:t> of </a:t>
-            </a:r>
+              <a:t>MySQL</a:t>
+            </a:r>
+            <a:r>
+              <a:rPr lang="sv-SE" dirty="0" smtClean="0"/>
+              <a:t> (Databas)</a:t>
+            </a:r>
+          </a:p>
+          <a:p>
             <a:r>
               <a:rPr lang="sv-SE" dirty="0" err="1" smtClean="0"/>
-              <a:t>ownership</a:t>
+              <a:t>Firefox</a:t>
+            </a:r>
+            <a:r>
+              <a:rPr lang="sv-SE" dirty="0" smtClean="0"/>
+              <a:t> (Webbläsare</a:t>
             </a:r>
             <a:r>
               <a:rPr lang="sv-SE" dirty="0" smtClean="0"/>
@@ -5171,45 +8080,6 @@
             </a:r>
           </a:p>
           <a:p>
-            <a:r>
-              <a:rPr lang="sv-SE" dirty="0" smtClean="0"/>
-              <a:t>Betala bara för det du behöver</a:t>
-            </a:r>
-            <a:endParaRPr lang="sv-SE" dirty="0" smtClean="0"/>
-          </a:p>
-          <a:p>
-            <a:r>
-              <a:rPr lang="sv-SE" dirty="0" smtClean="0"/>
-              <a:t>Obegränsat antal kopior av </a:t>
-            </a:r>
-            <a:r>
-              <a:rPr lang="sv-SE" dirty="0" smtClean="0"/>
-              <a:t>programvara</a:t>
-            </a:r>
-            <a:endParaRPr lang="sv-SE" dirty="0" smtClean="0"/>
-          </a:p>
-          <a:p>
-            <a:r>
-              <a:rPr lang="sv-SE" dirty="0" smtClean="0"/>
-              <a:t>Lägre krav att </a:t>
-            </a:r>
-            <a:r>
-              <a:rPr lang="sv-SE" dirty="0" smtClean="0"/>
-              <a:t>uppgradera</a:t>
-            </a:r>
-            <a:endParaRPr lang="sv-SE" dirty="0" smtClean="0"/>
-          </a:p>
-          <a:p>
-            <a:r>
-              <a:rPr lang="sv-SE" dirty="0" smtClean="0"/>
-              <a:t>Obefintlig risk för virus</a:t>
-            </a:r>
-          </a:p>
-          <a:p>
-            <a:r>
-              <a:rPr lang="sv-SE" dirty="0" smtClean="0"/>
-              <a:t>Minskar risken att låsa sig vid programvaror från ett företag</a:t>
-            </a:r>
             <a:endParaRPr lang="sv-SE" dirty="0"/>
           </a:p>
         </p:txBody>
@@ -5219,6 +8089,13 @@
   <p:clrMapOvr>
     <a:masterClrMapping/>
   </p:clrMapOvr>
+  <p:timing>
+    <p:tnLst>
+      <p:par>
+        <p:cTn id="1" dur="indefinite" restart="never" nodeType="tmRoot"/>
+      </p:par>
+    </p:tnLst>
+  </p:timing>
 </p:sld>
 </file>
 
@@ -5256,7 +8133,7 @@
           <a:p>
             <a:r>
               <a:rPr lang="sv-SE" dirty="0" smtClean="0"/>
-              <a:t>Kommunikation</a:t>
+              <a:t>Exempel</a:t>
             </a:r>
             <a:endParaRPr lang="sv-SE" dirty="0"/>
           </a:p>
@@ -5279,58 +8156,47 @@
           <a:p>
             <a:r>
               <a:rPr lang="sv-SE" dirty="0" smtClean="0"/>
-              <a:t>Kommersiell produkt</a:t>
-            </a:r>
-          </a:p>
-          <a:p>
-            <a:pPr>
-              <a:buNone/>
-            </a:pPr>
-            <a:r>
-              <a:rPr lang="sv-SE" dirty="0" smtClean="0"/>
-              <a:t>Säljare 	</a:t>
-            </a:r>
-            <a:r>
-              <a:rPr lang="sv-SE" dirty="0" smtClean="0">
-                <a:sym typeface="Wingdings" pitchFamily="2" charset="2"/>
-              </a:rPr>
-              <a:t></a:t>
-            </a:r>
-            <a:r>
-              <a:rPr lang="sv-SE" dirty="0" smtClean="0"/>
-              <a:t> 	Inköpare </a:t>
-            </a:r>
-          </a:p>
-          <a:p>
-            <a:pPr>
-              <a:buNone/>
-            </a:pPr>
-            <a:endParaRPr lang="sv-SE" dirty="0" smtClean="0"/>
-          </a:p>
-          <a:p>
-            <a:r>
-              <a:rPr lang="sv-SE" dirty="0" smtClean="0"/>
-              <a:t>Open </a:t>
-            </a:r>
+              <a:t>Apache (Webbserver)</a:t>
+            </a:r>
+          </a:p>
+          <a:p>
+            <a:r>
+              <a:rPr lang="sv-SE" dirty="0" smtClean="0"/>
+              <a:t>Linux (Operativsystem)</a:t>
+            </a:r>
+          </a:p>
+          <a:p>
             <a:r>
               <a:rPr lang="sv-SE" dirty="0" err="1" smtClean="0"/>
-              <a:t>source-produkt</a:t>
-            </a:r>
-            <a:endParaRPr lang="sv-SE" dirty="0" smtClean="0"/>
-          </a:p>
-          <a:p>
-            <a:pPr>
-              <a:buNone/>
-            </a:pPr>
-            <a:r>
-              <a:rPr lang="sv-SE" dirty="0" smtClean="0"/>
-              <a:t>Utvecklare 	</a:t>
-            </a:r>
-            <a:r>
-              <a:rPr lang="sv-SE" dirty="0" smtClean="0">
-                <a:sym typeface="Wingdings" pitchFamily="2" charset="2"/>
-              </a:rPr>
-              <a:t> 	Utvecklare</a:t>
+              <a:t>MySQL</a:t>
+            </a:r>
+            <a:r>
+              <a:rPr lang="sv-SE" dirty="0" smtClean="0"/>
+              <a:t> (Databas)</a:t>
+            </a:r>
+          </a:p>
+          <a:p>
+            <a:r>
+              <a:rPr lang="sv-SE" dirty="0" err="1" smtClean="0"/>
+              <a:t>Firefox</a:t>
+            </a:r>
+            <a:r>
+              <a:rPr lang="sv-SE" dirty="0" smtClean="0"/>
+              <a:t> (Webbläsare</a:t>
+            </a:r>
+            <a:r>
+              <a:rPr lang="sv-SE" dirty="0" smtClean="0"/>
+              <a:t>)</a:t>
+            </a:r>
+          </a:p>
+          <a:p>
+            <a:r>
+              <a:rPr lang="sv-SE" dirty="0" err="1" smtClean="0"/>
+              <a:t>Groovy</a:t>
+            </a:r>
+            <a:r>
+              <a:rPr lang="sv-SE" dirty="0" smtClean="0"/>
+              <a:t> (Programmeringsspråk)</a:t>
             </a:r>
             <a:endParaRPr lang="sv-SE" dirty="0" smtClean="0"/>
           </a:p>
@@ -5344,6 +8210,13 @@
   <p:clrMapOvr>
     <a:masterClrMapping/>
   </p:clrMapOvr>
+  <p:timing>
+    <p:tnLst>
+      <p:par>
+        <p:cTn id="1" dur="indefinite" restart="never" nodeType="tmRoot"/>
+      </p:par>
+    </p:tnLst>
+  </p:timing>
 </p:sld>
 </file>
 
@@ -5381,7 +8254,11 @@
           <a:p>
             <a:r>
               <a:rPr lang="sv-SE" dirty="0" smtClean="0"/>
-              <a:t>Är det inte svårt med support?</a:t>
+              <a:t>Företag inom Open </a:t>
+            </a:r>
+            <a:r>
+              <a:rPr lang="sv-SE" dirty="0" err="1" smtClean="0"/>
+              <a:t>Source</a:t>
             </a:r>
             <a:endParaRPr lang="sv-SE" dirty="0"/>
           </a:p>
@@ -5402,16 +8279,6 @@
           <a:bodyPr/>
           <a:lstStyle/>
           <a:p>
-            <a:r>
-              <a:rPr lang="sv-SE" dirty="0" smtClean="0"/>
-              <a:t>Support från utvecklarna av produkten</a:t>
-            </a:r>
-          </a:p>
-          <a:p>
-            <a:r>
-              <a:rPr lang="sv-SE" dirty="0" smtClean="0"/>
-              <a:t>Support från 3:e part</a:t>
-            </a:r>
             <a:endParaRPr lang="sv-SE" dirty="0"/>
           </a:p>
         </p:txBody>
@@ -5421,6 +8288,13 @@
   <p:clrMapOvr>
     <a:masterClrMapping/>
   </p:clrMapOvr>
+  <p:timing>
+    <p:tnLst>
+      <p:par>
+        <p:cTn id="1" dur="indefinite" restart="never" nodeType="tmRoot"/>
+      </p:par>
+    </p:tnLst>
+  </p:timing>
 </p:sld>
 </file>
 

</xml_diff>